<commit_message>
rebuilding site Thu Jul  9 21:54:42 EDT 2020
</commit_message>
<xml_diff>
--- a/lectures/004-GDPR.pptx
+++ b/lectures/004-GDPR.pptx
@@ -5,29 +5,28 @@
     <p:sldMasterId id="2147483648" r:id="rId1"/>
   </p:sldMasterIdLst>
   <p:notesMasterIdLst>
-    <p:notesMasterId r:id="rId22"/>
+    <p:notesMasterId r:id="rId21"/>
   </p:notesMasterIdLst>
   <p:sldIdLst>
     <p:sldId id="262" r:id="rId2"/>
-    <p:sldId id="265" r:id="rId3"/>
-    <p:sldId id="279" r:id="rId4"/>
-    <p:sldId id="280" r:id="rId5"/>
-    <p:sldId id="281" r:id="rId6"/>
-    <p:sldId id="282" r:id="rId7"/>
-    <p:sldId id="283" r:id="rId8"/>
-    <p:sldId id="284" r:id="rId9"/>
-    <p:sldId id="285" r:id="rId10"/>
-    <p:sldId id="286" r:id="rId11"/>
-    <p:sldId id="293" r:id="rId12"/>
-    <p:sldId id="288" r:id="rId13"/>
-    <p:sldId id="289" r:id="rId14"/>
-    <p:sldId id="294" r:id="rId15"/>
-    <p:sldId id="287" r:id="rId16"/>
-    <p:sldId id="290" r:id="rId17"/>
-    <p:sldId id="278" r:id="rId18"/>
-    <p:sldId id="291" r:id="rId19"/>
-    <p:sldId id="292" r:id="rId20"/>
-    <p:sldId id="266" r:id="rId21"/>
+    <p:sldId id="295" r:id="rId3"/>
+    <p:sldId id="265" r:id="rId4"/>
+    <p:sldId id="279" r:id="rId5"/>
+    <p:sldId id="280" r:id="rId6"/>
+    <p:sldId id="281" r:id="rId7"/>
+    <p:sldId id="282" r:id="rId8"/>
+    <p:sldId id="283" r:id="rId9"/>
+    <p:sldId id="284" r:id="rId10"/>
+    <p:sldId id="285" r:id="rId11"/>
+    <p:sldId id="286" r:id="rId12"/>
+    <p:sldId id="293" r:id="rId13"/>
+    <p:sldId id="288" r:id="rId14"/>
+    <p:sldId id="289" r:id="rId15"/>
+    <p:sldId id="294" r:id="rId16"/>
+    <p:sldId id="287" r:id="rId17"/>
+    <p:sldId id="290" r:id="rId18"/>
+    <p:sldId id="292" r:id="rId19"/>
+    <p:sldId id="266" r:id="rId20"/>
   </p:sldIdLst>
   <p:sldSz cx="12192000" cy="6858000"/>
   <p:notesSz cx="6858000" cy="9144000"/>
@@ -216,7 +215,7 @@
           <a:p>
             <a:fld id="{9A8075CA-E4BE-BA46-A08D-1D2A53775B0A}" type="datetimeFigureOut">
               <a:rPr lang="en-US" smtClean="0"/>
-              <a:t>6/21/20</a:t>
+              <a:t>7/9/20</a:t>
             </a:fld>
             <a:endParaRPr lang="en-US"/>
           </a:p>
@@ -723,7 +722,7 @@
           <a:p>
             <a:fld id="{23A5DD90-C89A-BB41-88A2-FC1EE1ABBA78}" type="datetimeFigureOut">
               <a:rPr lang="en-US" smtClean="0"/>
-              <a:t>6/21/20</a:t>
+              <a:t>7/9/20</a:t>
             </a:fld>
             <a:endParaRPr lang="en-US"/>
           </a:p>
@@ -925,7 +924,7 @@
           <a:p>
             <a:fld id="{23A5DD90-C89A-BB41-88A2-FC1EE1ABBA78}" type="datetimeFigureOut">
               <a:rPr lang="en-US" smtClean="0"/>
-              <a:t>6/21/20</a:t>
+              <a:t>7/9/20</a:t>
             </a:fld>
             <a:endParaRPr lang="en-US"/>
           </a:p>
@@ -1117,7 +1116,7 @@
           <a:p>
             <a:fld id="{23A5DD90-C89A-BB41-88A2-FC1EE1ABBA78}" type="datetimeFigureOut">
               <a:rPr lang="en-US" smtClean="0"/>
-              <a:t>6/21/20</a:t>
+              <a:t>7/9/20</a:t>
             </a:fld>
             <a:endParaRPr lang="en-US"/>
           </a:p>
@@ -1386,7 +1385,7 @@
           <a:p>
             <a:fld id="{23A5DD90-C89A-BB41-88A2-FC1EE1ABBA78}" type="datetimeFigureOut">
               <a:rPr lang="en-US" smtClean="0"/>
-              <a:t>6/21/20</a:t>
+              <a:t>7/9/20</a:t>
             </a:fld>
             <a:endParaRPr lang="en-US"/>
           </a:p>
@@ -1639,7 +1638,7 @@
           <a:p>
             <a:fld id="{23A5DD90-C89A-BB41-88A2-FC1EE1ABBA78}" type="datetimeFigureOut">
               <a:rPr lang="en-US" smtClean="0"/>
-              <a:t>6/21/20</a:t>
+              <a:t>7/9/20</a:t>
             </a:fld>
             <a:endParaRPr lang="en-US"/>
           </a:p>
@@ -2027,7 +2026,7 @@
           <a:p>
             <a:fld id="{23A5DD90-C89A-BB41-88A2-FC1EE1ABBA78}" type="datetimeFigureOut">
               <a:rPr lang="en-US" smtClean="0"/>
-              <a:t>6/21/20</a:t>
+              <a:t>7/9/20</a:t>
             </a:fld>
             <a:endParaRPr lang="en-US"/>
           </a:p>
@@ -2168,7 +2167,7 @@
           <a:p>
             <a:fld id="{23A5DD90-C89A-BB41-88A2-FC1EE1ABBA78}" type="datetimeFigureOut">
               <a:rPr lang="en-US" smtClean="0"/>
-              <a:t>6/21/20</a:t>
+              <a:t>7/9/20</a:t>
             </a:fld>
             <a:endParaRPr lang="en-US"/>
           </a:p>
@@ -2287,7 +2286,7 @@
           <a:p>
             <a:fld id="{23A5DD90-C89A-BB41-88A2-FC1EE1ABBA78}" type="datetimeFigureOut">
               <a:rPr lang="en-US" smtClean="0"/>
-              <a:t>6/21/20</a:t>
+              <a:t>7/9/20</a:t>
             </a:fld>
             <a:endParaRPr lang="en-US"/>
           </a:p>
@@ -2586,7 +2585,7 @@
           <a:p>
             <a:fld id="{23A5DD90-C89A-BB41-88A2-FC1EE1ABBA78}" type="datetimeFigureOut">
               <a:rPr lang="en-US" smtClean="0"/>
-              <a:t>6/21/20</a:t>
+              <a:t>7/9/20</a:t>
             </a:fld>
             <a:endParaRPr lang="en-US"/>
           </a:p>
@@ -2862,7 +2861,7 @@
           <a:p>
             <a:fld id="{23A5DD90-C89A-BB41-88A2-FC1EE1ABBA78}" type="datetimeFigureOut">
               <a:rPr lang="en-US" smtClean="0"/>
-              <a:t>6/21/20</a:t>
+              <a:t>7/9/20</a:t>
             </a:fld>
             <a:endParaRPr lang="en-US"/>
           </a:p>
@@ -3561,7 +3560,15 @@
           <a:p>
             <a:r>
               <a:rPr lang="en-US" dirty="0" smtClean="0"/>
-              <a:t>GDPR Fines</a:t>
+              <a:t>GDPR Principles </a:t>
+            </a:r>
+            <a:r>
+              <a:rPr lang="mr-IN" dirty="0" smtClean="0"/>
+              <a:t>–</a:t>
+            </a:r>
+            <a:r>
+              <a:rPr lang="en-US" dirty="0" smtClean="0"/>
+              <a:t> 2016 / 2018</a:t>
             </a:r>
             <a:endParaRPr lang="en-US" dirty="0"/>
           </a:p>
@@ -3579,103 +3586,80 @@
         </p:nvSpPr>
         <p:spPr/>
         <p:txBody>
-          <a:bodyPr/>
-          <a:lstStyle/>
-          <a:p>
-            <a:r>
-              <a:rPr lang="en-US" dirty="0" smtClean="0"/>
-              <a:t>Focused on the company</a:t>
-            </a:r>
-          </a:p>
-          <a:p>
-            <a:r>
-              <a:rPr lang="en-US" dirty="0" smtClean="0"/>
-              <a:t>Severe: Up to 20 Million Euros or 4% of company revenue</a:t>
-            </a:r>
-          </a:p>
-          <a:p>
-            <a:r>
-              <a:rPr lang="en-US" dirty="0" smtClean="0"/>
-              <a:t>Less Severe</a:t>
+          <a:bodyPr>
+            <a:normAutofit/>
+          </a:bodyPr>
+          <a:lstStyle/>
+          <a:p>
+            <a:r>
+              <a:rPr lang="en-US" dirty="0" smtClean="0"/>
+              <a:t>Lawfulness</a:t>
             </a:r>
             <a:r>
               <a:rPr lang="en-US" dirty="0"/>
-              <a:t>: Up to </a:t>
-            </a:r>
-            <a:r>
-              <a:rPr lang="en-US" dirty="0" smtClean="0"/>
-              <a:t>10 </a:t>
+              <a:t>, fairness and </a:t>
+            </a:r>
+            <a:r>
+              <a:rPr lang="en-US" dirty="0" smtClean="0"/>
+              <a:t>transparency</a:t>
+            </a:r>
+          </a:p>
+          <a:p>
+            <a:r>
+              <a:rPr lang="en-US" dirty="0" smtClean="0"/>
+              <a:t>Purpose limitation</a:t>
+            </a:r>
+          </a:p>
+          <a:p>
+            <a:r>
+              <a:rPr lang="en-US" dirty="0" smtClean="0"/>
+              <a:t>Data </a:t>
+            </a:r>
+            <a:r>
+              <a:rPr lang="en-US" dirty="0" err="1" smtClean="0"/>
+              <a:t>minimisation</a:t>
+            </a:r>
+            <a:endParaRPr lang="en-US" dirty="0" smtClean="0"/>
+          </a:p>
+          <a:p>
+            <a:r>
+              <a:rPr lang="en-US" dirty="0" smtClean="0"/>
+              <a:t>Accuracy</a:t>
+            </a:r>
+          </a:p>
+          <a:p>
+            <a:r>
+              <a:rPr lang="en-US" dirty="0" smtClean="0"/>
+              <a:t>Storage limitation</a:t>
+            </a:r>
+          </a:p>
+          <a:p>
+            <a:r>
+              <a:rPr lang="en-US" dirty="0" smtClean="0"/>
+              <a:t>Integrity </a:t>
             </a:r>
             <a:r>
               <a:rPr lang="en-US" dirty="0"/>
-              <a:t>Million Euros or </a:t>
-            </a:r>
-            <a:r>
-              <a:rPr lang="en-US" dirty="0" smtClean="0"/>
-              <a:t>2% </a:t>
-            </a:r>
-            <a:r>
-              <a:rPr lang="en-US" dirty="0"/>
-              <a:t>of company revenue</a:t>
-            </a:r>
-          </a:p>
-          <a:p>
+              <a:t>and confidentiality (</a:t>
+            </a:r>
+            <a:r>
+              <a:rPr lang="en-US" dirty="0" smtClean="0"/>
+              <a:t>security)</a:t>
+            </a:r>
+          </a:p>
+          <a:p>
+            <a:r>
+              <a:rPr lang="en-US" dirty="0" smtClean="0"/>
+              <a:t>Accountability</a:t>
+            </a:r>
             <a:endParaRPr lang="en-US" dirty="0"/>
-          </a:p>
-        </p:txBody>
-      </p:sp>
-      <p:sp>
-        <p:nvSpPr>
-          <p:cNvPr id="4" name="Rectangle 3"/>
-          <p:cNvSpPr/>
-          <p:nvPr/>
-        </p:nvSpPr>
-        <p:spPr>
-          <a:xfrm>
-            <a:off x="7434613" y="6000060"/>
-            <a:ext cx="4262192" cy="369332"/>
-          </a:xfrm>
-          <a:prstGeom prst="rect">
-            <a:avLst/>
-          </a:prstGeom>
-        </p:spPr>
-        <p:txBody>
-          <a:bodyPr wrap="none">
-            <a:spAutoFit/>
-          </a:bodyPr>
-          <a:lstStyle/>
-          <a:p>
-            <a:r>
-              <a:rPr lang="en-US" dirty="0">
-                <a:solidFill>
-                  <a:schemeClr val="bg1"/>
-                </a:solidFill>
-              </a:rPr>
-              <a:t>https://</a:t>
-            </a:r>
-            <a:r>
-              <a:rPr lang="en-US" dirty="0" err="1">
-                <a:solidFill>
-                  <a:schemeClr val="bg1"/>
-                </a:solidFill>
-              </a:rPr>
-              <a:t>gdpr-info.eu</a:t>
-            </a:r>
-            <a:r>
-              <a:rPr lang="en-US" dirty="0">
-                <a:solidFill>
-                  <a:schemeClr val="bg1"/>
-                </a:solidFill>
-              </a:rPr>
-              <a:t>/issues/fines-penalties/</a:t>
-            </a:r>
           </a:p>
         </p:txBody>
       </p:sp>
     </p:spTree>
     <p:extLst>
       <p:ext uri="{BB962C8B-B14F-4D97-AF65-F5344CB8AC3E}">
-        <p14:creationId xmlns:p14="http://schemas.microsoft.com/office/powerpoint/2010/main" val="1431742548"/>
+        <p14:creationId xmlns:p14="http://schemas.microsoft.com/office/powerpoint/2010/main" val="882650686"/>
       </p:ext>
     </p:extLst>
   </p:cSld>
@@ -3722,12 +3706,8 @@
               <a:t>GDPR </a:t>
             </a:r>
             <a:r>
-              <a:rPr lang="mr-IN" dirty="0" smtClean="0"/>
-              <a:t>–</a:t>
-            </a:r>
-            <a:r>
-              <a:rPr lang="en-US" dirty="0" smtClean="0"/>
-              <a:t> Cliff Notes</a:t>
+              <a:rPr lang="en-US" dirty="0" smtClean="0"/>
+              <a:t>Approach</a:t>
             </a:r>
             <a:endParaRPr lang="en-US" dirty="0"/>
           </a:p>
@@ -3745,104 +3725,62 @@
         </p:nvSpPr>
         <p:spPr/>
         <p:txBody>
-          <a:bodyPr>
-            <a:normAutofit lnSpcReduction="10000"/>
-          </a:bodyPr>
-          <a:lstStyle/>
-          <a:p>
-            <a:r>
-              <a:rPr lang="en-US" dirty="0" smtClean="0"/>
-              <a:t>Articles 5 </a:t>
-            </a:r>
-            <a:r>
-              <a:rPr lang="mr-IN" dirty="0" smtClean="0"/>
-              <a:t>–</a:t>
-            </a:r>
-            <a:r>
-              <a:rPr lang="en-US" dirty="0" smtClean="0"/>
-              <a:t> 7 </a:t>
-            </a:r>
-            <a:r>
-              <a:rPr lang="mr-IN" dirty="0" smtClean="0"/>
-              <a:t>–</a:t>
-            </a:r>
-            <a:r>
-              <a:rPr lang="en-US" dirty="0" smtClean="0"/>
-              <a:t> Principles</a:t>
-            </a:r>
-          </a:p>
-          <a:p>
-            <a:r>
-              <a:rPr lang="en-US" dirty="0" smtClean="0"/>
-              <a:t>Article 17 </a:t>
-            </a:r>
-            <a:r>
-              <a:rPr lang="mr-IN" dirty="0" smtClean="0"/>
-              <a:t>–</a:t>
-            </a:r>
-            <a:r>
-              <a:rPr lang="en-US" dirty="0" smtClean="0"/>
-              <a:t> The right to be forgotten</a:t>
-            </a:r>
-          </a:p>
-          <a:p>
-            <a:r>
-              <a:rPr lang="en-US" dirty="0" smtClean="0"/>
-              <a:t>Article 21 </a:t>
-            </a:r>
-            <a:r>
-              <a:rPr lang="mr-IN" dirty="0" smtClean="0"/>
-              <a:t>–</a:t>
-            </a:r>
-            <a:r>
-              <a:rPr lang="en-US" dirty="0" smtClean="0"/>
-              <a:t> The right to object (i.e. processing)</a:t>
-            </a:r>
-          </a:p>
-          <a:p>
-            <a:r>
-              <a:rPr lang="en-US" dirty="0" smtClean="0"/>
-              <a:t>Article 24 </a:t>
-            </a:r>
-            <a:r>
-              <a:rPr lang="mr-IN" dirty="0" smtClean="0"/>
-              <a:t>–</a:t>
-            </a:r>
-            <a:r>
-              <a:rPr lang="en-US" dirty="0" smtClean="0"/>
-              <a:t> Responsibility of the Controller</a:t>
-            </a:r>
-          </a:p>
-          <a:p>
-            <a:r>
-              <a:rPr lang="en-US" dirty="0" smtClean="0"/>
-              <a:t>Article 28 </a:t>
-            </a:r>
-            <a:r>
-              <a:rPr lang="mr-IN" dirty="0" smtClean="0"/>
-              <a:t>–</a:t>
-            </a:r>
-            <a:r>
-              <a:rPr lang="en-US" dirty="0" smtClean="0"/>
-              <a:t> The Processor</a:t>
-            </a:r>
-          </a:p>
-          <a:p>
-            <a:endParaRPr lang="en-US" dirty="0"/>
-          </a:p>
-          <a:p>
-            <a:r>
-              <a:rPr lang="en-US" dirty="0" smtClean="0"/>
-              <a:t>It is not difficult to read </a:t>
-            </a:r>
-            <a:r>
-              <a:rPr lang="mr-IN" dirty="0" smtClean="0"/>
-              <a:t>–</a:t>
-            </a:r>
-            <a:r>
-              <a:rPr lang="en-US" dirty="0" smtClean="0"/>
-              <a:t> perhaps we will do some deep dives with experts in future episodes</a:t>
-            </a:r>
+          <a:bodyPr/>
+          <a:lstStyle/>
+          <a:p>
+            <a:r>
+              <a:rPr lang="en-US" dirty="0" smtClean="0"/>
+              <a:t>Designed to finally win up against US-based world scale companies</a:t>
+            </a:r>
+          </a:p>
+          <a:p>
+            <a:r>
+              <a:rPr lang="en-US" dirty="0" smtClean="0"/>
+              <a:t>Or at least make a bunch of money losing...</a:t>
+            </a:r>
+            <a:endParaRPr lang="en-US" dirty="0" smtClean="0"/>
+          </a:p>
+          <a:p>
+            <a:r>
+              <a:rPr lang="en-US" dirty="0" smtClean="0"/>
+              <a:t>Severe: Up to 20 Million Euros or 4% of </a:t>
+            </a:r>
+            <a:r>
+              <a:rPr lang="en-US" dirty="0" smtClean="0"/>
+              <a:t>worldwide company </a:t>
+            </a:r>
+            <a:r>
+              <a:rPr lang="en-US" dirty="0" smtClean="0"/>
+              <a:t>revenue</a:t>
+            </a:r>
+          </a:p>
+          <a:p>
+            <a:r>
+              <a:rPr lang="en-US" dirty="0" smtClean="0"/>
+              <a:t>Less Severe</a:t>
+            </a:r>
+            <a:r>
+              <a:rPr lang="en-US" dirty="0"/>
+              <a:t>: Up to </a:t>
+            </a:r>
+            <a:r>
+              <a:rPr lang="en-US" dirty="0" smtClean="0"/>
+              <a:t>10 </a:t>
+            </a:r>
+            <a:r>
+              <a:rPr lang="en-US" dirty="0"/>
+              <a:t>Million Euros or </a:t>
+            </a:r>
+            <a:r>
+              <a:rPr lang="en-US" dirty="0" smtClean="0"/>
+              <a:t>2% </a:t>
+            </a:r>
+            <a:r>
+              <a:rPr lang="en-US" dirty="0"/>
+              <a:t>of company revenue</a:t>
+            </a:r>
+          </a:p>
+          <a:p>
             <a:endParaRPr lang="en-US" dirty="0"/>
           </a:p>
         </p:txBody>
@@ -3855,8 +3793,8 @@
         </p:nvSpPr>
         <p:spPr>
           <a:xfrm>
-            <a:off x="4414087" y="5558661"/>
-            <a:ext cx="2144626" cy="369332"/>
+            <a:off x="7434613" y="6000060"/>
+            <a:ext cx="4262192" cy="369332"/>
           </a:xfrm>
           <a:prstGeom prst="rect">
             <a:avLst/>
@@ -3890,7 +3828,7 @@
                   <a:schemeClr val="bg1"/>
                 </a:solidFill>
               </a:rPr>
-              <a:t>/</a:t>
+              <a:t>/issues/fines-penalties/</a:t>
             </a:r>
           </a:p>
         </p:txBody>
@@ -3898,7 +3836,7 @@
     </p:spTree>
     <p:extLst>
       <p:ext uri="{BB962C8B-B14F-4D97-AF65-F5344CB8AC3E}">
-        <p14:creationId xmlns:p14="http://schemas.microsoft.com/office/powerpoint/2010/main" val="1590583129"/>
+        <p14:creationId xmlns:p14="http://schemas.microsoft.com/office/powerpoint/2010/main" val="1431742548"/>
       </p:ext>
     </p:extLst>
   </p:cSld>
@@ -3942,30 +3880,7 @@
           <a:p>
             <a:r>
               <a:rPr lang="en-US" dirty="0" smtClean="0"/>
-              <a:t>In GDPR - Are you a controller or processor?</a:t>
-            </a:r>
-            <a:endParaRPr lang="en-US" dirty="0"/>
-          </a:p>
-        </p:txBody>
-      </p:sp>
-      <p:sp>
-        <p:nvSpPr>
-          <p:cNvPr id="3" name="Content Placeholder 2"/>
-          <p:cNvSpPr>
-            <a:spLocks noGrp="1"/>
-          </p:cNvSpPr>
-          <p:nvPr>
-            <p:ph idx="1"/>
-          </p:nvPr>
-        </p:nvSpPr>
-        <p:spPr/>
-        <p:txBody>
-          <a:bodyPr/>
-          <a:lstStyle/>
-          <a:p>
-            <a:r>
-              <a:rPr lang="en-US" dirty="0" smtClean="0"/>
-              <a:t>Data Controller </a:t>
+              <a:t>GDPR </a:t>
             </a:r>
             <a:r>
               <a:rPr lang="mr-IN" dirty="0" smtClean="0"/>
@@ -3973,13 +3888,32 @@
             </a:r>
             <a:r>
               <a:rPr lang="en-US" dirty="0" smtClean="0"/>
-              <a:t> Responsible to the end-user for all things GDPR</a:t>
-            </a:r>
-          </a:p>
-          <a:p>
-            <a:r>
-              <a:rPr lang="en-US" dirty="0" smtClean="0"/>
-              <a:t>Data Processor </a:t>
+              <a:t> Cliff Notes</a:t>
+            </a:r>
+            <a:endParaRPr lang="en-US" dirty="0"/>
+          </a:p>
+        </p:txBody>
+      </p:sp>
+      <p:sp>
+        <p:nvSpPr>
+          <p:cNvPr id="3" name="Content Placeholder 2"/>
+          <p:cNvSpPr>
+            <a:spLocks noGrp="1"/>
+          </p:cNvSpPr>
+          <p:nvPr>
+            <p:ph idx="1"/>
+          </p:nvPr>
+        </p:nvSpPr>
+        <p:spPr/>
+        <p:txBody>
+          <a:bodyPr>
+            <a:normAutofit/>
+          </a:bodyPr>
+          <a:lstStyle/>
+          <a:p>
+            <a:r>
+              <a:rPr lang="en-US" dirty="0" smtClean="0"/>
+              <a:t>Articles 5 </a:t>
             </a:r>
             <a:r>
               <a:rPr lang="mr-IN" dirty="0" smtClean="0"/>
@@ -3987,7 +3921,7 @@
             </a:r>
             <a:r>
               <a:rPr lang="en-US" dirty="0" smtClean="0"/>
-              <a:t> Far less responsibility </a:t>
+              <a:t> 7 </a:t>
             </a:r>
             <a:r>
               <a:rPr lang="mr-IN" dirty="0" smtClean="0"/>
@@ -3995,16 +3929,13 @@
             </a:r>
             <a:r>
               <a:rPr lang="en-US" dirty="0" smtClean="0"/>
-              <a:t> mostly make sure the controller can meet their responsibilities</a:t>
-            </a:r>
-          </a:p>
-          <a:p>
-            <a:endParaRPr lang="en-US" dirty="0"/>
-          </a:p>
-          <a:p>
-            <a:r>
-              <a:rPr lang="en-US" dirty="0" smtClean="0"/>
-              <a:t>Proper Example </a:t>
+              <a:t> Principles</a:t>
+            </a:r>
+          </a:p>
+          <a:p>
+            <a:r>
+              <a:rPr lang="en-US" dirty="0" smtClean="0"/>
+              <a:t>Article 17 </a:t>
             </a:r>
             <a:r>
               <a:rPr lang="mr-IN" dirty="0" smtClean="0"/>
@@ -4012,15 +3943,49 @@
             </a:r>
             <a:r>
               <a:rPr lang="en-US" dirty="0" smtClean="0"/>
-              <a:t> </a:t>
-            </a:r>
-            <a:r>
-              <a:rPr lang="en-US" dirty="0" err="1" smtClean="0"/>
-              <a:t>AirBnB</a:t>
-            </a:r>
-            <a:r>
-              <a:rPr lang="en-US" dirty="0" smtClean="0"/>
-              <a:t>/ Amazon AWS</a:t>
+              <a:t> The right to be forgotten</a:t>
+            </a:r>
+          </a:p>
+          <a:p>
+            <a:r>
+              <a:rPr lang="en-US" dirty="0" smtClean="0"/>
+              <a:t>Article 21 </a:t>
+            </a:r>
+            <a:r>
+              <a:rPr lang="mr-IN" dirty="0" smtClean="0"/>
+              <a:t>–</a:t>
+            </a:r>
+            <a:r>
+              <a:rPr lang="en-US" dirty="0" smtClean="0"/>
+              <a:t> The right to object (i.e. processing)</a:t>
+            </a:r>
+          </a:p>
+          <a:p>
+            <a:r>
+              <a:rPr lang="en-US" dirty="0" smtClean="0"/>
+              <a:t>Article 24 </a:t>
+            </a:r>
+            <a:r>
+              <a:rPr lang="mr-IN" dirty="0" smtClean="0"/>
+              <a:t>–</a:t>
+            </a:r>
+            <a:r>
+              <a:rPr lang="en-US" dirty="0" smtClean="0"/>
+              <a:t> Responsibility of the Controller</a:t>
+            </a:r>
+          </a:p>
+          <a:p>
+            <a:r>
+              <a:rPr lang="en-US" dirty="0" smtClean="0"/>
+              <a:t>Article 28 </a:t>
+            </a:r>
+            <a:r>
+              <a:rPr lang="mr-IN" dirty="0" smtClean="0"/>
+              <a:t>–</a:t>
+            </a:r>
+            <a:r>
+              <a:rPr lang="en-US" dirty="0" smtClean="0"/>
+              <a:t> The Processor</a:t>
             </a:r>
           </a:p>
           <a:p>
@@ -4029,23 +3994,19 @@
           <a:p>
             <a:r>
               <a:rPr lang="en-US" dirty="0" smtClean="0"/>
-              <a:t>Google "</a:t>
-            </a:r>
-            <a:r>
-              <a:rPr lang="en-US" dirty="0" err="1" smtClean="0"/>
-              <a:t>AirBnB</a:t>
-            </a:r>
-            <a:r>
-              <a:rPr lang="en-US" dirty="0" smtClean="0"/>
-              <a:t> Privacy Policy" and "</a:t>
-            </a:r>
-            <a:r>
-              <a:rPr lang="en-US" dirty="0" err="1" smtClean="0"/>
-              <a:t>AirBnB</a:t>
-            </a:r>
-            <a:r>
-              <a:rPr lang="en-US" dirty="0" smtClean="0"/>
-              <a:t> Right to Be Forgotten"</a:t>
+              <a:t>It is not difficult to read </a:t>
+            </a:r>
+            <a:r>
+              <a:rPr lang="mr-IN" dirty="0" smtClean="0"/>
+              <a:t>–</a:t>
+            </a:r>
+            <a:r>
+              <a:rPr lang="en-US" dirty="0" smtClean="0"/>
+              <a:t> we will </a:t>
+            </a:r>
+            <a:r>
+              <a:rPr lang="en-US" dirty="0" smtClean="0"/>
+              <a:t>talk more about this</a:t>
             </a:r>
             <a:endParaRPr lang="en-US" dirty="0"/>
           </a:p>
@@ -4059,166 +4020,50 @@
         </p:nvSpPr>
         <p:spPr>
           <a:xfrm>
-            <a:off x="2682240" y="5423724"/>
-            <a:ext cx="9509760" cy="584775"/>
+            <a:off x="4414087" y="5558661"/>
+            <a:ext cx="2144626" cy="369332"/>
           </a:xfrm>
           <a:prstGeom prst="rect">
             <a:avLst/>
           </a:prstGeom>
         </p:spPr>
         <p:txBody>
-          <a:bodyPr wrap="square">
+          <a:bodyPr wrap="none">
             <a:spAutoFit/>
           </a:bodyPr>
           <a:lstStyle/>
           <a:p>
             <a:r>
-              <a:rPr lang="en-US" sz="1600" dirty="0">
+              <a:rPr lang="en-US" dirty="0">
                 <a:solidFill>
                   <a:schemeClr val="bg1"/>
                 </a:solidFill>
-                <a:latin typeface="Helvetica" charset="0"/>
               </a:rPr>
               <a:t>https://</a:t>
             </a:r>
             <a:r>
-              <a:rPr lang="en-US" sz="1600" dirty="0" err="1" smtClean="0">
+              <a:rPr lang="en-US" dirty="0" err="1">
                 <a:solidFill>
                   <a:schemeClr val="bg1"/>
                 </a:solidFill>
-                <a:latin typeface="Helvetica" charset="0"/>
               </a:rPr>
-              <a:t>www.airbnb.com</a:t>
-            </a:r>
-            <a:r>
-              <a:rPr lang="en-US" sz="1600" dirty="0" smtClean="0">
+              <a:t>gdpr-info.eu</a:t>
+            </a:r>
+            <a:r>
+              <a:rPr lang="en-US" dirty="0">
                 <a:solidFill>
                   <a:schemeClr val="bg1"/>
                 </a:solidFill>
-                <a:latin typeface="Helvetica" charset="0"/>
               </a:rPr>
-              <a:t>/terms/</a:t>
-            </a:r>
-            <a:r>
-              <a:rPr lang="en-US" sz="1600" dirty="0" err="1" smtClean="0">
-                <a:solidFill>
-                  <a:schemeClr val="bg1"/>
-                </a:solidFill>
-                <a:latin typeface="Helvetica" charset="0"/>
-              </a:rPr>
-              <a:t>privacy_policy</a:t>
-            </a:r>
-            <a:endParaRPr lang="en-US" sz="1600" dirty="0" smtClean="0">
-              <a:solidFill>
-                <a:schemeClr val="bg1"/>
-              </a:solidFill>
-              <a:latin typeface="Helvetica" charset="0"/>
-            </a:endParaRPr>
-          </a:p>
-          <a:p>
-            <a:r>
-              <a:rPr lang="en-US" sz="1600" dirty="0" smtClean="0">
-                <a:solidFill>
-                  <a:schemeClr val="bg1"/>
-                </a:solidFill>
-                <a:latin typeface="Helvetica" charset="0"/>
-              </a:rPr>
-              <a:t>https</a:t>
-            </a:r>
-            <a:r>
-              <a:rPr lang="en-US" sz="1600" dirty="0">
-                <a:solidFill>
-                  <a:schemeClr val="bg1"/>
-                </a:solidFill>
-                <a:latin typeface="Helvetica" charset="0"/>
-              </a:rPr>
-              <a:t>://</a:t>
-            </a:r>
-            <a:r>
-              <a:rPr lang="en-US" sz="1600" dirty="0" err="1" smtClean="0">
-                <a:solidFill>
-                  <a:schemeClr val="bg1"/>
-                </a:solidFill>
-                <a:latin typeface="Helvetica" charset="0"/>
-              </a:rPr>
-              <a:t>www.airbnb.com</a:t>
-            </a:r>
-            <a:r>
-              <a:rPr lang="en-US" sz="1600" dirty="0" smtClean="0">
-                <a:solidFill>
-                  <a:schemeClr val="bg1"/>
-                </a:solidFill>
-                <a:latin typeface="Helvetica" charset="0"/>
-              </a:rPr>
-              <a:t>/help/article/2273/</a:t>
-            </a:r>
-            <a:r>
-              <a:rPr lang="en-US" sz="1600" dirty="0" err="1" smtClean="0">
-                <a:solidFill>
-                  <a:schemeClr val="bg1"/>
-                </a:solidFill>
-                <a:latin typeface="Helvetica" charset="0"/>
-              </a:rPr>
-              <a:t>im</a:t>
-            </a:r>
-            <a:r>
-              <a:rPr lang="en-US" sz="1600" dirty="0" smtClean="0">
-                <a:solidFill>
-                  <a:schemeClr val="bg1"/>
-                </a:solidFill>
-                <a:latin typeface="Helvetica" charset="0"/>
-              </a:rPr>
-              <a:t>-an-</a:t>
-            </a:r>
-            <a:r>
-              <a:rPr lang="en-US" sz="1600" dirty="0" err="1" smtClean="0">
-                <a:solidFill>
-                  <a:schemeClr val="bg1"/>
-                </a:solidFill>
-                <a:latin typeface="Helvetica" charset="0"/>
-              </a:rPr>
-              <a:t>airbnb</a:t>
-            </a:r>
-            <a:r>
-              <a:rPr lang="en-US" sz="1600" dirty="0" smtClean="0">
-                <a:solidFill>
-                  <a:schemeClr val="bg1"/>
-                </a:solidFill>
-                <a:latin typeface="Helvetica" charset="0"/>
-              </a:rPr>
-              <a:t>-user-how-do-</a:t>
-            </a:r>
-            <a:r>
-              <a:rPr lang="en-US" sz="1600" dirty="0" err="1" smtClean="0">
-                <a:solidFill>
-                  <a:schemeClr val="bg1"/>
-                </a:solidFill>
-                <a:latin typeface="Helvetica" charset="0"/>
-              </a:rPr>
-              <a:t>i</a:t>
-            </a:r>
-            <a:r>
-              <a:rPr lang="en-US" sz="1600" dirty="0" smtClean="0">
-                <a:solidFill>
-                  <a:schemeClr val="bg1"/>
-                </a:solidFill>
-                <a:latin typeface="Helvetica" charset="0"/>
-              </a:rPr>
-              <a:t>-exercise-my-data-subject-rights</a:t>
-            </a:r>
-            <a:endParaRPr lang="en-US" sz="1600" dirty="0">
-              <a:solidFill>
-                <a:schemeClr val="bg1"/>
-              </a:solidFill>
-              <a:latin typeface="Helvetica" charset="0"/>
-            </a:endParaRPr>
+              <a:t>/</a:t>
+            </a:r>
           </a:p>
         </p:txBody>
       </p:sp>
     </p:spTree>
     <p:extLst>
       <p:ext uri="{BB962C8B-B14F-4D97-AF65-F5344CB8AC3E}">
-        <p14:creationId xmlns:p14="http://schemas.microsoft.com/office/powerpoint/2010/main" val="1937096072"/>
+        <p14:creationId xmlns:p14="http://schemas.microsoft.com/office/powerpoint/2010/main" val="1590583129"/>
       </p:ext>
     </p:extLst>
   </p:cSld>
@@ -4262,7 +4107,7 @@
           <a:p>
             <a:r>
               <a:rPr lang="en-US" dirty="0" smtClean="0"/>
-              <a:t>Is the LMS a Processor or Controller?</a:t>
+              <a:t>In GDPR - Are you a controller or processor?</a:t>
             </a:r>
             <a:endParaRPr lang="en-US" dirty="0"/>
           </a:p>
@@ -4280,20 +4125,12 @@
         </p:nvSpPr>
         <p:spPr/>
         <p:txBody>
-          <a:bodyPr>
-            <a:normAutofit lnSpcReduction="10000"/>
-          </a:bodyPr>
-          <a:lstStyle/>
-          <a:p>
-            <a:r>
-              <a:rPr lang="en-US" dirty="0" smtClean="0"/>
-              <a:t>If a university uses a commercial cloud based LMS that runs on Amazon, who gets what role?</a:t>
-            </a:r>
-          </a:p>
-          <a:p>
-            <a:r>
-              <a:rPr lang="en-US" dirty="0" smtClean="0"/>
-              <a:t>The University is clearly the controller </a:t>
+          <a:bodyPr/>
+          <a:lstStyle/>
+          <a:p>
+            <a:r>
+              <a:rPr lang="en-US" dirty="0" smtClean="0"/>
+              <a:t>Data Controller </a:t>
             </a:r>
             <a:r>
               <a:rPr lang="mr-IN" dirty="0" smtClean="0"/>
@@ -4301,47 +4138,248 @@
             </a:r>
             <a:r>
               <a:rPr lang="en-US" dirty="0" smtClean="0"/>
-              <a:t> full responsibility</a:t>
-            </a:r>
-          </a:p>
-          <a:p>
-            <a:r>
-              <a:rPr lang="en-US" dirty="0" smtClean="0"/>
-              <a:t>Amazon is clearly a processor</a:t>
-            </a:r>
-          </a:p>
-          <a:p>
-            <a:r>
-              <a:rPr lang="en-US" dirty="0" smtClean="0"/>
-              <a:t>The LMS</a:t>
-            </a:r>
-          </a:p>
-          <a:p>
-            <a:pPr lvl="1"/>
-            <a:r>
-              <a:rPr lang="en-US" dirty="0" smtClean="0"/>
-              <a:t>If the LMS were a processor...</a:t>
-            </a:r>
-          </a:p>
-          <a:p>
-            <a:pPr lvl="1"/>
-            <a:r>
-              <a:rPr lang="en-US" dirty="0" smtClean="0"/>
-              <a:t>If the LMS were a controller...</a:t>
-            </a:r>
-          </a:p>
-          <a:p>
-            <a:r>
-              <a:rPr lang="en-US" dirty="0" smtClean="0"/>
-              <a:t>Coursera (the MOOC provider) ...</a:t>
-            </a:r>
+              <a:t> Responsible to the end-user for all things GDPR</a:t>
+            </a:r>
+          </a:p>
+          <a:p>
+            <a:r>
+              <a:rPr lang="en-US" dirty="0" smtClean="0"/>
+              <a:t>Data Processor </a:t>
+            </a:r>
+            <a:r>
+              <a:rPr lang="mr-IN" dirty="0" smtClean="0"/>
+              <a:t>–</a:t>
+            </a:r>
+            <a:r>
+              <a:rPr lang="en-US" dirty="0"/>
+              <a:t> </a:t>
+            </a:r>
+            <a:r>
+              <a:rPr lang="en-US" dirty="0" smtClean="0"/>
+              <a:t>L</a:t>
+            </a:r>
+            <a:r>
+              <a:rPr lang="en-US" dirty="0" smtClean="0"/>
+              <a:t>ess </a:t>
+            </a:r>
+            <a:r>
+              <a:rPr lang="en-US" dirty="0" smtClean="0"/>
+              <a:t>responsibility </a:t>
+            </a:r>
+            <a:r>
+              <a:rPr lang="mr-IN" dirty="0" smtClean="0"/>
+              <a:t>–</a:t>
+            </a:r>
+            <a:r>
+              <a:rPr lang="en-US" dirty="0" smtClean="0"/>
+              <a:t> mostly make sure the controller can meet their responsibilities</a:t>
+            </a:r>
+          </a:p>
+          <a:p>
+            <a:endParaRPr lang="en-US" dirty="0"/>
+          </a:p>
+          <a:p>
+            <a:r>
+              <a:rPr lang="en-US" dirty="0" smtClean="0"/>
+              <a:t>Proper Example </a:t>
+            </a:r>
+            <a:r>
+              <a:rPr lang="mr-IN" dirty="0" smtClean="0"/>
+              <a:t>–</a:t>
+            </a:r>
+            <a:r>
+              <a:rPr lang="en-US" dirty="0" smtClean="0"/>
+              <a:t> </a:t>
+            </a:r>
+            <a:r>
+              <a:rPr lang="en-US" dirty="0" err="1" smtClean="0"/>
+              <a:t>AirBnB</a:t>
+            </a:r>
+            <a:r>
+              <a:rPr lang="en-US" dirty="0" smtClean="0"/>
+              <a:t>/ Amazon AWS</a:t>
+            </a:r>
+          </a:p>
+          <a:p>
+            <a:endParaRPr lang="en-US" dirty="0"/>
+          </a:p>
+          <a:p>
+            <a:r>
+              <a:rPr lang="en-US" dirty="0" smtClean="0"/>
+              <a:t>Google "Zillow Privacy Policy" and "Zillow Right to Be Forgotten"</a:t>
+            </a:r>
+            <a:endParaRPr lang="en-US" dirty="0"/>
+          </a:p>
+        </p:txBody>
+      </p:sp>
+      <p:sp>
+        <p:nvSpPr>
+          <p:cNvPr id="4" name="Rectangle 3"/>
+          <p:cNvSpPr/>
+          <p:nvPr/>
+        </p:nvSpPr>
+        <p:spPr>
+          <a:xfrm>
+            <a:off x="2682240" y="5423724"/>
+            <a:ext cx="9509760" cy="584775"/>
+          </a:xfrm>
+          <a:prstGeom prst="rect">
+            <a:avLst/>
+          </a:prstGeom>
+        </p:spPr>
+        <p:txBody>
+          <a:bodyPr wrap="square">
+            <a:spAutoFit/>
+          </a:bodyPr>
+          <a:lstStyle/>
+          <a:p>
+            <a:r>
+              <a:rPr lang="en-US" sz="1600" dirty="0">
+                <a:solidFill>
+                  <a:schemeClr val="bg1"/>
+                </a:solidFill>
+                <a:latin typeface="Helvetica" charset="0"/>
+              </a:rPr>
+              <a:t>https://</a:t>
+            </a:r>
+            <a:r>
+              <a:rPr lang="en-US" sz="1600" dirty="0" err="1" smtClean="0">
+                <a:solidFill>
+                  <a:schemeClr val="bg1"/>
+                </a:solidFill>
+                <a:latin typeface="Helvetica" charset="0"/>
+              </a:rPr>
+              <a:t>www.airbnb.com</a:t>
+            </a:r>
+            <a:r>
+              <a:rPr lang="en-US" sz="1600" dirty="0" smtClean="0">
+                <a:solidFill>
+                  <a:schemeClr val="bg1"/>
+                </a:solidFill>
+                <a:latin typeface="Helvetica" charset="0"/>
+              </a:rPr>
+              <a:t>/terms/</a:t>
+            </a:r>
+            <a:r>
+              <a:rPr lang="en-US" sz="1600" dirty="0" err="1" smtClean="0">
+                <a:solidFill>
+                  <a:schemeClr val="bg1"/>
+                </a:solidFill>
+                <a:latin typeface="Helvetica" charset="0"/>
+              </a:rPr>
+              <a:t>privacy_policy</a:t>
+            </a:r>
+            <a:endParaRPr lang="en-US" sz="1600" dirty="0" smtClean="0">
+              <a:solidFill>
+                <a:schemeClr val="bg1"/>
+              </a:solidFill>
+              <a:latin typeface="Helvetica" charset="0"/>
+            </a:endParaRPr>
+          </a:p>
+          <a:p>
+            <a:r>
+              <a:rPr lang="en-US" sz="1600" dirty="0" smtClean="0">
+                <a:solidFill>
+                  <a:schemeClr val="bg1"/>
+                </a:solidFill>
+                <a:latin typeface="Helvetica" charset="0"/>
+              </a:rPr>
+              <a:t>https</a:t>
+            </a:r>
+            <a:r>
+              <a:rPr lang="en-US" sz="1600" dirty="0">
+                <a:solidFill>
+                  <a:schemeClr val="bg1"/>
+                </a:solidFill>
+                <a:latin typeface="Helvetica" charset="0"/>
+              </a:rPr>
+              <a:t>://</a:t>
+            </a:r>
+            <a:r>
+              <a:rPr lang="en-US" sz="1600" dirty="0" err="1" smtClean="0">
+                <a:solidFill>
+                  <a:schemeClr val="bg1"/>
+                </a:solidFill>
+                <a:latin typeface="Helvetica" charset="0"/>
+              </a:rPr>
+              <a:t>www.airbnb.com</a:t>
+            </a:r>
+            <a:r>
+              <a:rPr lang="en-US" sz="1600" dirty="0" smtClean="0">
+                <a:solidFill>
+                  <a:schemeClr val="bg1"/>
+                </a:solidFill>
+                <a:latin typeface="Helvetica" charset="0"/>
+              </a:rPr>
+              <a:t>/help/article/2273/</a:t>
+            </a:r>
+            <a:r>
+              <a:rPr lang="en-US" sz="1600" dirty="0" err="1" smtClean="0">
+                <a:solidFill>
+                  <a:schemeClr val="bg1"/>
+                </a:solidFill>
+                <a:latin typeface="Helvetica" charset="0"/>
+              </a:rPr>
+              <a:t>im</a:t>
+            </a:r>
+            <a:r>
+              <a:rPr lang="en-US" sz="1600" dirty="0" smtClean="0">
+                <a:solidFill>
+                  <a:schemeClr val="bg1"/>
+                </a:solidFill>
+                <a:latin typeface="Helvetica" charset="0"/>
+              </a:rPr>
+              <a:t>-an-</a:t>
+            </a:r>
+            <a:r>
+              <a:rPr lang="en-US" sz="1600" dirty="0" err="1" smtClean="0">
+                <a:solidFill>
+                  <a:schemeClr val="bg1"/>
+                </a:solidFill>
+                <a:latin typeface="Helvetica" charset="0"/>
+              </a:rPr>
+              <a:t>airbnb</a:t>
+            </a:r>
+            <a:r>
+              <a:rPr lang="en-US" sz="1600" dirty="0" smtClean="0">
+                <a:solidFill>
+                  <a:schemeClr val="bg1"/>
+                </a:solidFill>
+                <a:latin typeface="Helvetica" charset="0"/>
+              </a:rPr>
+              <a:t>-user-how-do-</a:t>
+            </a:r>
+            <a:r>
+              <a:rPr lang="en-US" sz="1600" dirty="0" err="1" smtClean="0">
+                <a:solidFill>
+                  <a:schemeClr val="bg1"/>
+                </a:solidFill>
+                <a:latin typeface="Helvetica" charset="0"/>
+              </a:rPr>
+              <a:t>i</a:t>
+            </a:r>
+            <a:r>
+              <a:rPr lang="en-US" sz="1600" dirty="0" smtClean="0">
+                <a:solidFill>
+                  <a:schemeClr val="bg1"/>
+                </a:solidFill>
+                <a:latin typeface="Helvetica" charset="0"/>
+              </a:rPr>
+              <a:t>-exercise-my-data-subject-rights</a:t>
+            </a:r>
+            <a:endParaRPr lang="en-US" sz="1600" dirty="0">
+              <a:solidFill>
+                <a:schemeClr val="bg1"/>
+              </a:solidFill>
+              <a:latin typeface="Helvetica" charset="0"/>
+            </a:endParaRPr>
           </a:p>
         </p:txBody>
       </p:sp>
     </p:spTree>
     <p:extLst>
       <p:ext uri="{BB962C8B-B14F-4D97-AF65-F5344CB8AC3E}">
-        <p14:creationId xmlns:p14="http://schemas.microsoft.com/office/powerpoint/2010/main" val="1824668950"/>
+        <p14:creationId xmlns:p14="http://schemas.microsoft.com/office/powerpoint/2010/main" val="1937096072"/>
       </p:ext>
     </p:extLst>
   </p:cSld>
@@ -4385,7 +4423,38 @@
           <a:p>
             <a:r>
               <a:rPr lang="en-US" dirty="0" smtClean="0"/>
-              <a:t>GDPR </a:t>
+              <a:t>Is the LMS a Processor or Controller?</a:t>
+            </a:r>
+            <a:endParaRPr lang="en-US" dirty="0"/>
+          </a:p>
+        </p:txBody>
+      </p:sp>
+      <p:sp>
+        <p:nvSpPr>
+          <p:cNvPr id="3" name="Content Placeholder 2"/>
+          <p:cNvSpPr>
+            <a:spLocks noGrp="1"/>
+          </p:cNvSpPr>
+          <p:nvPr>
+            <p:ph idx="1"/>
+          </p:nvPr>
+        </p:nvSpPr>
+        <p:spPr/>
+        <p:txBody>
+          <a:bodyPr>
+            <a:normAutofit/>
+          </a:bodyPr>
+          <a:lstStyle/>
+          <a:p>
+            <a:r>
+              <a:rPr lang="en-US" dirty="0" smtClean="0"/>
+              <a:t>If a university outsources to a commercial cloud based LMS that runs on Amazon, who gets what role?</a:t>
+            </a:r>
+          </a:p>
+          <a:p>
+            <a:r>
+              <a:rPr lang="en-US" dirty="0" smtClean="0"/>
+              <a:t>The University is clearly the controller </a:t>
             </a:r>
             <a:r>
               <a:rPr lang="mr-IN" dirty="0" smtClean="0"/>
@@ -4393,75 +4462,41 @@
             </a:r>
             <a:r>
               <a:rPr lang="en-US" dirty="0" smtClean="0"/>
-              <a:t> Who sues who?</a:t>
-            </a:r>
-            <a:endParaRPr lang="en-US" dirty="0"/>
-          </a:p>
-        </p:txBody>
-      </p:sp>
-      <p:sp>
-        <p:nvSpPr>
-          <p:cNvPr id="3" name="Content Placeholder 2"/>
-          <p:cNvSpPr>
-            <a:spLocks noGrp="1"/>
-          </p:cNvSpPr>
-          <p:nvPr>
-            <p:ph idx="1"/>
-          </p:nvPr>
-        </p:nvSpPr>
-        <p:spPr/>
-        <p:txBody>
-          <a:bodyPr/>
-          <a:lstStyle/>
-          <a:p>
-            <a:r>
-              <a:rPr lang="en-US" dirty="0" smtClean="0"/>
-              <a:t>A "country regulator" decides which violations merit attention kind of like a prosecutor</a:t>
-            </a:r>
-          </a:p>
-          <a:p>
-            <a:r>
-              <a:rPr lang="en-US" dirty="0" smtClean="0"/>
-              <a:t>Kind of like calling the police when your credit card info was stolen by someone from the Ukraine</a:t>
-            </a:r>
-          </a:p>
-          <a:p>
-            <a:r>
-              <a:rPr lang="en-US" dirty="0" smtClean="0"/>
-              <a:t>According to one reviewer, "</a:t>
-            </a:r>
-            <a:r>
-              <a:rPr lang="en-US" dirty="0"/>
-              <a:t>The intention of GDPR is to go after the big tech companies - Google, Facebook, </a:t>
-            </a:r>
-            <a:r>
-              <a:rPr lang="en-US" dirty="0" smtClean="0"/>
-              <a:t>etc. </a:t>
-            </a:r>
-            <a:r>
-              <a:rPr lang="en-US" dirty="0"/>
-              <a:t>- and </a:t>
-            </a:r>
-            <a:r>
-              <a:rPr lang="en-US" dirty="0" smtClean="0"/>
-              <a:t>smaller learning companies may </a:t>
-            </a:r>
-            <a:r>
-              <a:rPr lang="en-US" dirty="0"/>
-              <a:t>be too low-profile to warrant close attention</a:t>
-            </a:r>
-            <a:r>
-              <a:rPr lang="en-US" dirty="0" smtClean="0"/>
-              <a:t>."</a:t>
-            </a:r>
-            <a:endParaRPr lang="en-US" dirty="0"/>
+              <a:t> full responsibility</a:t>
+            </a:r>
+          </a:p>
+          <a:p>
+            <a:r>
+              <a:rPr lang="en-US" dirty="0" smtClean="0"/>
+              <a:t>Amazon is clearly a processor or sub-processor (not controller)</a:t>
+            </a:r>
+          </a:p>
+          <a:p>
+            <a:r>
+              <a:rPr lang="en-US" dirty="0" smtClean="0"/>
+              <a:t>The LMS</a:t>
+            </a:r>
+          </a:p>
+          <a:p>
+            <a:pPr lvl="1"/>
+            <a:r>
+              <a:rPr lang="en-US" dirty="0" smtClean="0"/>
+              <a:t>If the LMS were a processor...</a:t>
+            </a:r>
+          </a:p>
+          <a:p>
+            <a:pPr lvl="1"/>
+            <a:r>
+              <a:rPr lang="en-US" dirty="0" smtClean="0"/>
+              <a:t>If the LMS were a controller...</a:t>
+            </a:r>
           </a:p>
         </p:txBody>
       </p:sp>
     </p:spTree>
     <p:extLst>
       <p:ext uri="{BB962C8B-B14F-4D97-AF65-F5344CB8AC3E}">
-        <p14:creationId xmlns:p14="http://schemas.microsoft.com/office/powerpoint/2010/main" val="9769033"/>
+        <p14:creationId xmlns:p14="http://schemas.microsoft.com/office/powerpoint/2010/main" val="1824668950"/>
       </p:ext>
     </p:extLst>
   </p:cSld>
@@ -4505,37 +4540,7 @@
           <a:p>
             <a:r>
               <a:rPr lang="en-US" dirty="0" smtClean="0"/>
-              <a:t>GDPR Enforcement Tracker</a:t>
-            </a:r>
-            <a:endParaRPr lang="en-US" dirty="0"/>
-          </a:p>
-        </p:txBody>
-      </p:sp>
-      <p:sp>
-        <p:nvSpPr>
-          <p:cNvPr id="3" name="Content Placeholder 2"/>
-          <p:cNvSpPr>
-            <a:spLocks noGrp="1"/>
-          </p:cNvSpPr>
-          <p:nvPr>
-            <p:ph idx="1"/>
-          </p:nvPr>
-        </p:nvSpPr>
-        <p:spPr>
-          <a:xfrm>
-            <a:off x="838200" y="1825625"/>
-            <a:ext cx="10515600" cy="2558485"/>
-          </a:xfrm>
-        </p:spPr>
-        <p:txBody>
-          <a:bodyPr>
-            <a:normAutofit lnSpcReduction="10000"/>
-          </a:bodyPr>
-          <a:lstStyle/>
-          <a:p>
-            <a:r>
-              <a:rPr lang="en-US" dirty="0" smtClean="0"/>
-              <a:t>Search for University(1 Italy protestor), LMS (0) , learn(1 </a:t>
+              <a:t>GDPR </a:t>
             </a:r>
             <a:r>
               <a:rPr lang="mr-IN" dirty="0" smtClean="0"/>
@@ -4543,69 +4548,11 @@
             </a:r>
             <a:r>
               <a:rPr lang="en-US" dirty="0" smtClean="0"/>
-              <a:t> Norway medical)</a:t>
-            </a:r>
-          </a:p>
-          <a:p>
-            <a:r>
-              <a:rPr lang="en-US" dirty="0" smtClean="0"/>
-              <a:t>Search for all the LMS vendors by name </a:t>
-            </a:r>
-            <a:r>
-              <a:rPr lang="mr-IN" dirty="0" smtClean="0"/>
-              <a:t>–</a:t>
-            </a:r>
-            <a:r>
-              <a:rPr lang="en-US" dirty="0" smtClean="0"/>
-              <a:t> no hits </a:t>
-            </a:r>
-            <a:r>
-              <a:rPr lang="mr-IN" dirty="0" smtClean="0"/>
-              <a:t>–</a:t>
-            </a:r>
-            <a:r>
-              <a:rPr lang="en-US" dirty="0" smtClean="0"/>
-              <a:t> WOOT!</a:t>
-            </a:r>
-          </a:p>
-          <a:p>
-            <a:r>
-              <a:rPr lang="en-US" dirty="0" smtClean="0"/>
-              <a:t>Look by country </a:t>
-            </a:r>
-            <a:r>
-              <a:rPr lang="mr-IN" dirty="0" smtClean="0"/>
-              <a:t>–</a:t>
-            </a:r>
-            <a:r>
-              <a:rPr lang="en-US" dirty="0" smtClean="0"/>
-              <a:t> UK / Spain are in the lead!  </a:t>
-            </a:r>
-            <a:r>
-              <a:rPr lang="en-US" dirty="0" smtClean="0">
-                <a:sym typeface="Wingdings"/>
-              </a:rPr>
-              <a:t></a:t>
-            </a:r>
-          </a:p>
-          <a:p>
-            <a:r>
-              <a:rPr lang="en-US" dirty="0" smtClean="0">
-                <a:sym typeface="Wingdings"/>
-              </a:rPr>
-              <a:t>Then just scan the issues </a:t>
-            </a:r>
-            <a:r>
-              <a:rPr lang="mr-IN" dirty="0" smtClean="0">
-                <a:sym typeface="Wingdings"/>
-              </a:rPr>
-              <a:t>–</a:t>
-            </a:r>
-            <a:r>
-              <a:rPr lang="en-US" dirty="0" smtClean="0">
-                <a:sym typeface="Wingdings"/>
-              </a:rPr>
-              <a:t> recall that the focus on companies making mistakes</a:t>
+              <a:t> </a:t>
+            </a:r>
+            <a:r>
+              <a:rPr lang="en-US" dirty="0" smtClean="0"/>
+              <a:t>Enforcement / Prosecution</a:t>
             </a:r>
             <a:endParaRPr lang="en-US" dirty="0"/>
           </a:p>
@@ -4613,105 +4560,67 @@
       </p:sp>
       <p:sp>
         <p:nvSpPr>
-          <p:cNvPr id="4" name="Rectangle 3"/>
-          <p:cNvSpPr/>
-          <p:nvPr/>
-        </p:nvSpPr>
-        <p:spPr>
-          <a:xfrm>
-            <a:off x="7272546" y="5887326"/>
-            <a:ext cx="3834768" cy="369332"/>
-          </a:xfrm>
-          <a:prstGeom prst="rect">
-            <a:avLst/>
-          </a:prstGeom>
-        </p:spPr>
-        <p:txBody>
-          <a:bodyPr wrap="none">
-            <a:spAutoFit/>
-          </a:bodyPr>
-          <a:lstStyle/>
-          <a:p>
-            <a:r>
-              <a:rPr lang="en-US" dirty="0">
-                <a:solidFill>
-                  <a:schemeClr val="bg1"/>
-                </a:solidFill>
-              </a:rPr>
-              <a:t>https://</a:t>
-            </a:r>
-            <a:r>
-              <a:rPr lang="en-US" dirty="0" err="1">
-                <a:solidFill>
-                  <a:schemeClr val="bg1"/>
-                </a:solidFill>
-              </a:rPr>
-              <a:t>www.enforcementtracker.com</a:t>
-            </a:r>
-            <a:r>
-              <a:rPr lang="en-US" dirty="0">
-                <a:solidFill>
-                  <a:schemeClr val="bg1"/>
-                </a:solidFill>
-              </a:rPr>
-              <a:t>/</a:t>
-            </a:r>
-          </a:p>
-        </p:txBody>
-      </p:sp>
-      <p:sp>
-        <p:nvSpPr>
-          <p:cNvPr id="5" name="TextBox 4"/>
-          <p:cNvSpPr txBox="1"/>
-          <p:nvPr/>
-        </p:nvSpPr>
-        <p:spPr>
-          <a:xfrm>
-            <a:off x="838200" y="4522867"/>
-            <a:ext cx="10026042" cy="954107"/>
-          </a:xfrm>
-          <a:prstGeom prst="rect">
-            <a:avLst/>
-          </a:prstGeom>
-          <a:noFill/>
-        </p:spPr>
-        <p:txBody>
-          <a:bodyPr wrap="square" rtlCol="0">
-            <a:spAutoFit/>
-          </a:bodyPr>
-          <a:lstStyle/>
-          <a:p>
-            <a:r>
-              <a:rPr lang="en-US" sz="2800" dirty="0">
-                <a:solidFill>
-                  <a:srgbClr val="FFFF00"/>
-                </a:solidFill>
-              </a:rPr>
-              <a:t>Usage of CCTV camera which also captured the public roads outside in a violation of the so called principle of data </a:t>
-            </a:r>
-            <a:r>
-              <a:rPr lang="en-US" sz="2800" dirty="0" err="1">
-                <a:solidFill>
-                  <a:srgbClr val="FFFF00"/>
-                </a:solidFill>
-              </a:rPr>
-              <a:t>minimisation</a:t>
-            </a:r>
-            <a:r>
-              <a:rPr lang="en-US" sz="2800" dirty="0">
-                <a:solidFill>
-                  <a:srgbClr val="FFFF00"/>
-                </a:solidFill>
-              </a:rPr>
-              <a:t>.</a:t>
-            </a:r>
+          <p:cNvPr id="3" name="Content Placeholder 2"/>
+          <p:cNvSpPr>
+            <a:spLocks noGrp="1"/>
+          </p:cNvSpPr>
+          <p:nvPr>
+            <p:ph idx="1"/>
+          </p:nvPr>
+        </p:nvSpPr>
+        <p:spPr/>
+        <p:txBody>
+          <a:bodyPr/>
+          <a:lstStyle/>
+          <a:p>
+            <a:r>
+              <a:rPr lang="en-US" dirty="0" smtClean="0"/>
+              <a:t>A "country regulator" decides which violations merit attention kind of like a prosecutor</a:t>
+            </a:r>
+          </a:p>
+          <a:p>
+            <a:r>
+              <a:rPr lang="en-US" dirty="0" smtClean="0"/>
+              <a:t>Kind of like calling the police when your credit card info was stolen by someone from the Ukraine</a:t>
+            </a:r>
+          </a:p>
+          <a:p>
+            <a:r>
+              <a:rPr lang="en-US" dirty="0" smtClean="0"/>
+              <a:t>According to one reviewer, "</a:t>
+            </a:r>
+            <a:r>
+              <a:rPr lang="en-US" dirty="0"/>
+              <a:t>The intention of GDPR is to go after the big tech companies - Google, Facebook, </a:t>
+            </a:r>
+            <a:r>
+              <a:rPr lang="en-US" dirty="0" smtClean="0"/>
+              <a:t>etc. </a:t>
+            </a:r>
+            <a:r>
+              <a:rPr lang="en-US" dirty="0"/>
+              <a:t>- and </a:t>
+            </a:r>
+            <a:r>
+              <a:rPr lang="en-US" dirty="0" smtClean="0"/>
+              <a:t>smaller learning companies may </a:t>
+            </a:r>
+            <a:r>
+              <a:rPr lang="en-US" dirty="0"/>
+              <a:t>be too low-profile to warrant close attention</a:t>
+            </a:r>
+            <a:r>
+              <a:rPr lang="en-US" dirty="0" smtClean="0"/>
+              <a:t>."</a:t>
+            </a:r>
+            <a:endParaRPr lang="en-US" dirty="0"/>
           </a:p>
         </p:txBody>
       </p:sp>
     </p:spTree>
     <p:extLst>
       <p:ext uri="{BB962C8B-B14F-4D97-AF65-F5344CB8AC3E}">
-        <p14:creationId xmlns:p14="http://schemas.microsoft.com/office/powerpoint/2010/main" val="1445921387"/>
+        <p14:creationId xmlns:p14="http://schemas.microsoft.com/office/powerpoint/2010/main" val="9769033"/>
       </p:ext>
     </p:extLst>
   </p:cSld>
@@ -4755,7 +4664,7 @@
           <a:p>
             <a:r>
               <a:rPr lang="en-US" dirty="0" smtClean="0"/>
-              <a:t>A GDPR Story..</a:t>
+              <a:t>GDPR Enforcement Tracker</a:t>
             </a:r>
             <a:endParaRPr lang="en-US" dirty="0"/>
           </a:p>
@@ -4771,7 +4680,12 @@
             <p:ph idx="1"/>
           </p:nvPr>
         </p:nvSpPr>
-        <p:spPr/>
+        <p:spPr>
+          <a:xfrm>
+            <a:off x="838200" y="1825625"/>
+            <a:ext cx="10515600" cy="2558485"/>
+          </a:xfrm>
+        </p:spPr>
         <p:txBody>
           <a:bodyPr>
             <a:normAutofit/>
@@ -4780,19 +4694,18 @@
           <a:p>
             <a:r>
               <a:rPr lang="en-US" dirty="0" smtClean="0"/>
-              <a:t>A university asked their LMS vendor if the vendor had GDPR covered</a:t>
-            </a:r>
-          </a:p>
-          <a:p>
-            <a:r>
-              <a:rPr lang="en-US" dirty="0" smtClean="0"/>
-              <a:t>The vendor said 'yes - we have it all under control'</a:t>
-            </a:r>
-          </a:p>
-          <a:p>
-            <a:r>
-              <a:rPr lang="en-US" dirty="0" smtClean="0"/>
-              <a:t>The university said 'great </a:t>
+              <a:t>Search for University(1 Italy protestor), LMS (0) , </a:t>
+            </a:r>
+            <a:r>
+              <a:rPr lang="en-US" dirty="0" smtClean="0"/>
+              <a:t>learn(1)</a:t>
+            </a:r>
+            <a:endParaRPr lang="en-US" dirty="0" smtClean="0"/>
+          </a:p>
+          <a:p>
+            <a:r>
+              <a:rPr lang="en-US" dirty="0" smtClean="0"/>
+              <a:t>Search for all the LMS vendors by name </a:t>
             </a:r>
             <a:r>
               <a:rPr lang="mr-IN" dirty="0" smtClean="0"/>
@@ -4800,28 +4713,161 @@
             </a:r>
             <a:r>
               <a:rPr lang="en-US" dirty="0" smtClean="0"/>
-              <a:t> we love your product' </a:t>
-            </a:r>
-          </a:p>
-          <a:p>
-            <a:r>
-              <a:rPr lang="en-US" dirty="0" smtClean="0"/>
-              <a:t>If the controller does not even try, being a processor is pretty easy </a:t>
-            </a:r>
-          </a:p>
-          <a:p>
-            <a:r>
-              <a:rPr lang="en-US" dirty="0" smtClean="0"/>
-              <a:t> Student's don't report universities that violate GDPR</a:t>
+              <a:t> no hits </a:t>
+            </a:r>
+            <a:r>
+              <a:rPr lang="mr-IN" dirty="0" smtClean="0"/>
+              <a:t>–</a:t>
+            </a:r>
+            <a:r>
+              <a:rPr lang="en-US" dirty="0" smtClean="0"/>
+              <a:t> WOOT!</a:t>
+            </a:r>
+          </a:p>
+          <a:p>
+            <a:r>
+              <a:rPr lang="en-US" dirty="0" smtClean="0"/>
+              <a:t>Look by country </a:t>
+            </a:r>
+            <a:r>
+              <a:rPr lang="mr-IN" dirty="0" smtClean="0"/>
+              <a:t>–</a:t>
+            </a:r>
+            <a:r>
+              <a:rPr lang="en-US" dirty="0" smtClean="0"/>
+              <a:t> UK / Spain are in the lead!  </a:t>
+            </a:r>
+            <a:r>
+              <a:rPr lang="en-US" dirty="0" smtClean="0">
+                <a:sym typeface="Wingdings"/>
+              </a:rPr>
+              <a:t></a:t>
+            </a:r>
+          </a:p>
+          <a:p>
+            <a:r>
+              <a:rPr lang="en-US" dirty="0" smtClean="0">
+                <a:sym typeface="Wingdings"/>
+              </a:rPr>
+              <a:t>Then just scan the issues </a:t>
+            </a:r>
+            <a:r>
+              <a:rPr lang="mr-IN" dirty="0" smtClean="0">
+                <a:sym typeface="Wingdings"/>
+              </a:rPr>
+              <a:t>–</a:t>
+            </a:r>
+            <a:r>
+              <a:rPr lang="en-US" dirty="0" smtClean="0">
+                <a:sym typeface="Wingdings"/>
+              </a:rPr>
+              <a:t> recall that the focus on companies making mistakes</a:t>
             </a:r>
             <a:endParaRPr lang="en-US" dirty="0"/>
+          </a:p>
+        </p:txBody>
+      </p:sp>
+      <p:sp>
+        <p:nvSpPr>
+          <p:cNvPr id="4" name="Rectangle 3"/>
+          <p:cNvSpPr/>
+          <p:nvPr/>
+        </p:nvSpPr>
+        <p:spPr>
+          <a:xfrm>
+            <a:off x="7272546" y="5887326"/>
+            <a:ext cx="3834768" cy="369332"/>
+          </a:xfrm>
+          <a:prstGeom prst="rect">
+            <a:avLst/>
+          </a:prstGeom>
+        </p:spPr>
+        <p:txBody>
+          <a:bodyPr wrap="none">
+            <a:spAutoFit/>
+          </a:bodyPr>
+          <a:lstStyle/>
+          <a:p>
+            <a:r>
+              <a:rPr lang="en-US" dirty="0">
+                <a:solidFill>
+                  <a:schemeClr val="bg1"/>
+                </a:solidFill>
+              </a:rPr>
+              <a:t>https://</a:t>
+            </a:r>
+            <a:r>
+              <a:rPr lang="en-US" dirty="0" err="1">
+                <a:solidFill>
+                  <a:schemeClr val="bg1"/>
+                </a:solidFill>
+              </a:rPr>
+              <a:t>www.enforcementtracker.com</a:t>
+            </a:r>
+            <a:r>
+              <a:rPr lang="en-US" dirty="0">
+                <a:solidFill>
+                  <a:schemeClr val="bg1"/>
+                </a:solidFill>
+              </a:rPr>
+              <a:t>/</a:t>
+            </a:r>
+          </a:p>
+        </p:txBody>
+      </p:sp>
+      <p:sp>
+        <p:nvSpPr>
+          <p:cNvPr id="5" name="TextBox 4"/>
+          <p:cNvSpPr txBox="1"/>
+          <p:nvPr/>
+        </p:nvSpPr>
+        <p:spPr>
+          <a:xfrm>
+            <a:off x="838200" y="4522867"/>
+            <a:ext cx="10026042" cy="954107"/>
+          </a:xfrm>
+          <a:prstGeom prst="rect">
+            <a:avLst/>
+          </a:prstGeom>
+          <a:noFill/>
+        </p:spPr>
+        <p:txBody>
+          <a:bodyPr wrap="square" rtlCol="0">
+            <a:spAutoFit/>
+          </a:bodyPr>
+          <a:lstStyle/>
+          <a:p>
+            <a:r>
+              <a:rPr lang="en-US" sz="2800" dirty="0">
+                <a:solidFill>
+                  <a:srgbClr val="FFFF00"/>
+                </a:solidFill>
+              </a:rPr>
+              <a:t>Usage of CCTV camera which also captured the public roads outside in a violation of the so called principle of data </a:t>
+            </a:r>
+            <a:r>
+              <a:rPr lang="en-US" sz="2800" dirty="0" err="1">
+                <a:solidFill>
+                  <a:srgbClr val="FFFF00"/>
+                </a:solidFill>
+              </a:rPr>
+              <a:t>minimisation</a:t>
+            </a:r>
+            <a:r>
+              <a:rPr lang="en-US" sz="2800" dirty="0">
+                <a:solidFill>
+                  <a:srgbClr val="FFFF00"/>
+                </a:solidFill>
+              </a:rPr>
+              <a:t>.</a:t>
+            </a:r>
           </a:p>
         </p:txBody>
       </p:sp>
     </p:spTree>
     <p:extLst>
       <p:ext uri="{BB962C8B-B14F-4D97-AF65-F5344CB8AC3E}">
-        <p14:creationId xmlns:p14="http://schemas.microsoft.com/office/powerpoint/2010/main" val="466077213"/>
+        <p14:creationId xmlns:p14="http://schemas.microsoft.com/office/powerpoint/2010/main" val="1445921387"/>
       </p:ext>
     </p:extLst>
   </p:cSld>
@@ -4834,14 +4880,6 @@
 <file path=ppt/slides/slide17.xml><?xml version="1.0" encoding="utf-8"?>
 <p:sld xmlns:a="http://schemas.openxmlformats.org/drawingml/2006/main" xmlns:r="http://schemas.openxmlformats.org/officeDocument/2006/relationships" xmlns:p="http://schemas.openxmlformats.org/presentationml/2006/main">
   <p:cSld>
-    <p:bg>
-      <p:bgPr>
-        <a:solidFill>
-          <a:schemeClr val="bg1"/>
-        </a:solidFill>
-        <a:effectLst/>
-      </p:bgPr>
-    </p:bg>
     <p:spTree>
       <p:nvGrpSpPr>
         <p:cNvPr id="1" name=""/>
@@ -4856,163 +4894,97 @@
           <a:chExt cx="0" cy="0"/>
         </a:xfrm>
       </p:grpSpPr>
-      <p:pic>
-        <p:nvPicPr>
-          <p:cNvPr id="1026" name="Picture 2" descr="he Last of the Spirits-John Leech, 1843.jpg"/>
-          <p:cNvPicPr>
-            <a:picLocks noChangeAspect="1" noChangeArrowheads="1"/>
-          </p:cNvPicPr>
-          <p:nvPr/>
-        </p:nvPicPr>
-        <p:blipFill rotWithShape="1">
-          <a:blip r:embed="rId2">
-            <a:extLst>
-              <a:ext uri="{28A0092B-C50C-407E-A947-70E740481C1C}">
-                <a14:useLocalDpi xmlns:a14="http://schemas.microsoft.com/office/drawing/2010/main" val="0"/>
-              </a:ext>
-            </a:extLst>
-          </a:blip>
-          <a:srcRect b="4268"/>
-          <a:stretch/>
-        </p:blipFill>
-        <p:spPr bwMode="auto">
-          <a:xfrm>
-            <a:off x="7552266" y="10"/>
-            <a:ext cx="4639733" cy="6857990"/>
-          </a:xfrm>
-          <a:prstGeom prst="rect">
-            <a:avLst/>
-          </a:prstGeom>
-          <a:noFill/>
-          <a:extLst>
-            <a:ext uri="{909E8E84-426E-40DD-AFC4-6F175D3DCCD1}">
-              <a14:hiddenFill xmlns:a14="http://schemas.microsoft.com/office/drawing/2010/main">
-                <a:solidFill>
-                  <a:srgbClr val="FFFFFF"/>
-                </a:solidFill>
-              </a14:hiddenFill>
-            </a:ext>
-          </a:extLst>
-        </p:spPr>
-      </p:pic>
-      <p:sp>
-        <p:nvSpPr>
-          <p:cNvPr id="4" name="Rectangle 3"/>
-          <p:cNvSpPr/>
-          <p:nvPr/>
-        </p:nvSpPr>
-        <p:spPr>
-          <a:xfrm>
-            <a:off x="3778682" y="6411993"/>
-            <a:ext cx="7273447" cy="338554"/>
-          </a:xfrm>
-          <a:prstGeom prst="rect">
-            <a:avLst/>
-          </a:prstGeom>
-          <a:solidFill>
-            <a:schemeClr val="bg1"/>
-          </a:solidFill>
-        </p:spPr>
-        <p:txBody>
-          <a:bodyPr wrap="square">
-            <a:spAutoFit/>
+      <p:sp>
+        <p:nvSpPr>
+          <p:cNvPr id="2" name="Title 1"/>
+          <p:cNvSpPr>
+            <a:spLocks noGrp="1"/>
+          </p:cNvSpPr>
+          <p:nvPr>
+            <p:ph type="title"/>
+          </p:nvPr>
+        </p:nvSpPr>
+        <p:spPr/>
+        <p:txBody>
+          <a:bodyPr/>
+          <a:lstStyle/>
+          <a:p>
+            <a:r>
+              <a:rPr lang="en-US" dirty="0" smtClean="0"/>
+              <a:t>A GDPR Story..</a:t>
+            </a:r>
+            <a:endParaRPr lang="en-US" dirty="0"/>
+          </a:p>
+        </p:txBody>
+      </p:sp>
+      <p:sp>
+        <p:nvSpPr>
+          <p:cNvPr id="3" name="Content Placeholder 2"/>
+          <p:cNvSpPr>
+            <a:spLocks noGrp="1"/>
+          </p:cNvSpPr>
+          <p:nvPr>
+            <p:ph idx="1"/>
+          </p:nvPr>
+        </p:nvSpPr>
+        <p:spPr/>
+        <p:txBody>
+          <a:bodyPr>
+            <a:noAutofit/>
           </a:bodyPr>
           <a:lstStyle/>
           <a:p>
             <a:r>
-              <a:rPr lang="en-US" sz="1600" dirty="0"/>
-              <a:t>http://</a:t>
-            </a:r>
-            <a:r>
-              <a:rPr lang="en-US" sz="1600" dirty="0" err="1"/>
-              <a:t>www.open-bks.com</a:t>
-            </a:r>
-            <a:r>
-              <a:rPr lang="en-US" sz="1600" dirty="0"/>
-              <a:t>/library/classics/</a:t>
-            </a:r>
-            <a:r>
-              <a:rPr lang="en-US" sz="1600" dirty="0" err="1"/>
-              <a:t>dickens_charles_carol</a:t>
-            </a:r>
-            <a:r>
-              <a:rPr lang="en-US" sz="1600" dirty="0"/>
-              <a:t>/carol-127-128.html</a:t>
-            </a:r>
-          </a:p>
-        </p:txBody>
-      </p:sp>
-      <p:sp>
-        <p:nvSpPr>
-          <p:cNvPr id="5" name="TextBox 4"/>
-          <p:cNvSpPr txBox="1"/>
-          <p:nvPr/>
-        </p:nvSpPr>
-        <p:spPr>
-          <a:xfrm>
-            <a:off x="459284" y="726184"/>
-            <a:ext cx="6638795" cy="4893647"/>
-          </a:xfrm>
-          <a:prstGeom prst="rect">
-            <a:avLst/>
-          </a:prstGeom>
-          <a:noFill/>
-        </p:spPr>
-        <p:txBody>
-          <a:bodyPr wrap="square" rtlCol="0">
-            <a:spAutoFit/>
-          </a:bodyPr>
-          <a:lstStyle/>
-          <a:p>
-            <a:r>
-              <a:rPr lang="en-US" sz="2400" dirty="0"/>
-              <a:t>"Before I draw nearer to that stone to which you point," said Scrooge, "answer me one question. </a:t>
-            </a:r>
-            <a:r>
-              <a:rPr lang="en-US" sz="2400" dirty="0" smtClean="0"/>
-              <a:t> Are </a:t>
-            </a:r>
-            <a:r>
-              <a:rPr lang="en-US" sz="2400" dirty="0"/>
-              <a:t>these the shadows of the things that Will be, or are they shadows of the things that May be only?" </a:t>
-            </a:r>
-            <a:endParaRPr lang="en-US" sz="2400" dirty="0" smtClean="0"/>
-          </a:p>
-          <a:p>
-            <a:r>
-              <a:rPr lang="en-US" sz="2400" dirty="0" smtClean="0"/>
-              <a:t> </a:t>
-            </a:r>
-          </a:p>
-          <a:p>
-            <a:r>
-              <a:rPr lang="en-US" sz="2400" dirty="0" smtClean="0"/>
-              <a:t>Still </a:t>
-            </a:r>
-            <a:r>
-              <a:rPr lang="en-US" sz="2400" dirty="0"/>
-              <a:t>the Ghost pointed downward to the grave by which it stood</a:t>
-            </a:r>
-            <a:r>
-              <a:rPr lang="en-US" sz="2400" dirty="0" smtClean="0"/>
-              <a:t>.</a:t>
-            </a:r>
-          </a:p>
-          <a:p>
-            <a:endParaRPr lang="en-US" sz="2400" dirty="0" smtClean="0"/>
-          </a:p>
-          <a:p>
-            <a:r>
-              <a:rPr lang="en-US" sz="2400" dirty="0"/>
-              <a:t>"Men's courses will foreshadow certain ends, to which, if persevered in, they must lead," said Scrooge. "But if the courses be departed from, the ends will change. Say it is thus with what you show me</a:t>
-            </a:r>
-            <a:r>
-              <a:rPr lang="en-US" sz="2400" dirty="0" smtClean="0"/>
-              <a:t>!"  The </a:t>
-            </a:r>
-            <a:r>
-              <a:rPr lang="en-US" sz="2400" dirty="0"/>
-              <a:t>Spirit was immovable as ever.</a:t>
+              <a:rPr lang="en-US" sz="3200" dirty="0" smtClean="0"/>
+              <a:t>A university asked their LMS vendor if the vendor had GDPR covered</a:t>
+            </a:r>
+          </a:p>
+          <a:p>
+            <a:r>
+              <a:rPr lang="en-US" sz="3200" dirty="0" smtClean="0"/>
+              <a:t>The vendor said 'yes - we have it all under control'</a:t>
+            </a:r>
+          </a:p>
+          <a:p>
+            <a:r>
+              <a:rPr lang="en-US" sz="3200" dirty="0" smtClean="0"/>
+              <a:t>The university said 'great </a:t>
+            </a:r>
+            <a:r>
+              <a:rPr lang="mr-IN" sz="3200" dirty="0" smtClean="0"/>
+              <a:t>–</a:t>
+            </a:r>
+            <a:r>
+              <a:rPr lang="en-US" sz="3200" dirty="0" smtClean="0"/>
+              <a:t> we love your product' </a:t>
+            </a:r>
+          </a:p>
+          <a:p>
+            <a:r>
+              <a:rPr lang="en-US" sz="3200" dirty="0" smtClean="0"/>
+              <a:t>There is no auditor.  No prosecutor.  No student marches.</a:t>
+            </a:r>
+          </a:p>
+          <a:p>
+            <a:r>
+              <a:rPr lang="en-US" sz="3200" dirty="0"/>
+              <a:t>If a </a:t>
+            </a:r>
+            <a:r>
+              <a:rPr lang="en-US" sz="3200" dirty="0" smtClean="0"/>
+              <a:t>University </a:t>
+            </a:r>
+            <a:r>
+              <a:rPr lang="en-US" sz="3200" dirty="0"/>
+              <a:t>pretends GDPR is not a problem </a:t>
+            </a:r>
+            <a:r>
+              <a:rPr lang="mr-IN" sz="3200" dirty="0"/>
+              <a:t>–</a:t>
+            </a:r>
+            <a:r>
+              <a:rPr lang="en-US" sz="3200" dirty="0"/>
+              <a:t> it is not </a:t>
             </a:r>
           </a:p>
         </p:txBody>
@@ -5020,12 +4992,12 @@
     </p:spTree>
     <p:extLst>
       <p:ext uri="{BB962C8B-B14F-4D97-AF65-F5344CB8AC3E}">
-        <p14:creationId xmlns:p14="http://schemas.microsoft.com/office/powerpoint/2010/main" val="2524046876"/>
+        <p14:creationId xmlns:p14="http://schemas.microsoft.com/office/powerpoint/2010/main" val="466077213"/>
       </p:ext>
     </p:extLst>
   </p:cSld>
   <p:clrMapOvr>
-    <a:overrideClrMapping bg1="dk1" tx1="lt1" bg2="dk2" tx2="lt2" accent1="accent1" accent2="accent2" accent3="accent3" accent4="accent4" accent5="accent5" accent6="accent6" hlink="hlink" folHlink="folHlink"/>
+    <a:masterClrMapping/>
   </p:clrMapOvr>
 </p:sld>
 </file>
@@ -5064,7 +5036,7 @@
           <a:p>
             <a:r>
               <a:rPr lang="en-US" dirty="0" smtClean="0"/>
-              <a:t>Christmas Carol and Redemption </a:t>
+              <a:t>Summary</a:t>
             </a:r>
             <a:endParaRPr lang="en-US" dirty="0"/>
           </a:p>
@@ -5082,36 +5054,26 @@
         </p:nvSpPr>
         <p:spPr/>
         <p:txBody>
-          <a:bodyPr/>
-          <a:lstStyle/>
-          <a:p>
-            <a:r>
-              <a:rPr lang="en-US" dirty="0" smtClean="0"/>
-              <a:t>Culturally, France and Germany actually care about learner privacy They use GDPR as a framework to interact with their vendors</a:t>
-            </a:r>
-          </a:p>
-          <a:p>
-            <a:r>
-              <a:rPr lang="en-US" dirty="0" smtClean="0"/>
-              <a:t>While British and Spanish universities see GDPR as a barrier to bypass</a:t>
-            </a:r>
-          </a:p>
-          <a:p>
-            <a:r>
-              <a:rPr lang="en-US" dirty="0" smtClean="0"/>
-              <a:t>French / German Universities are the "enforcers" of GDPR</a:t>
-            </a:r>
-          </a:p>
-          <a:p>
-            <a:r>
-              <a:rPr lang="en-US" dirty="0" smtClean="0"/>
-              <a:t>They are helpful and friendly but also unyielding</a:t>
-            </a:r>
-          </a:p>
-          <a:p>
-            <a:r>
-              <a:rPr lang="en-US" dirty="0" smtClean="0"/>
-              <a:t>They use and invest in open source </a:t>
+          <a:bodyPr>
+            <a:normAutofit/>
+          </a:bodyPr>
+          <a:lstStyle/>
+          <a:p>
+            <a:r>
+              <a:rPr lang="en-US" dirty="0" smtClean="0"/>
+              <a:t>European privacy efforts are great for intent and expression</a:t>
+            </a:r>
+          </a:p>
+          <a:p>
+            <a:r>
+              <a:rPr lang="en-US" dirty="0" smtClean="0"/>
+              <a:t>Twenty-five years later they still are mighty leaky</a:t>
+            </a:r>
+          </a:p>
+          <a:p>
+            <a:r>
+              <a:rPr lang="en-US" dirty="0" smtClean="0"/>
+              <a:t>They are a great platform to build on </a:t>
             </a:r>
             <a:r>
               <a:rPr lang="mr-IN" dirty="0" smtClean="0"/>
@@ -5119,147 +5081,38 @@
             </a:r>
             <a:r>
               <a:rPr lang="en-US" dirty="0" smtClean="0"/>
-              <a:t> even if it is not as slick as the "big US companies"</a:t>
+              <a:t> but sadly </a:t>
+            </a:r>
+            <a:r>
+              <a:rPr lang="en-US" dirty="0" smtClean="0"/>
+              <a:t>the standard of care is set by the university itself</a:t>
+            </a:r>
+            <a:endParaRPr lang="en-US" dirty="0" smtClean="0"/>
+          </a:p>
+          <a:p>
+            <a:r>
+              <a:rPr lang="en-US" dirty="0" smtClean="0"/>
+              <a:t>They need adoption, implementation, and most importantly iteration in a learning context.</a:t>
+            </a:r>
+          </a:p>
+          <a:p>
+            <a:r>
+              <a:rPr lang="en-US" smtClean="0"/>
+              <a:t>Coming up - </a:t>
+            </a:r>
+            <a:r>
+              <a:rPr lang="en-US" smtClean="0"/>
+              <a:t>California </a:t>
+            </a:r>
+            <a:r>
+              <a:rPr lang="en-US" dirty="0"/>
+              <a:t>Consumer Privacy Act of </a:t>
+            </a:r>
+            <a:r>
+              <a:rPr lang="en-US" dirty="0" smtClean="0"/>
+              <a:t>2018</a:t>
             </a:r>
             <a:endParaRPr lang="en-US" dirty="0"/>
-          </a:p>
-        </p:txBody>
-      </p:sp>
-    </p:spTree>
-    <p:extLst>
-      <p:ext uri="{BB962C8B-B14F-4D97-AF65-F5344CB8AC3E}">
-        <p14:creationId xmlns:p14="http://schemas.microsoft.com/office/powerpoint/2010/main" val="1569610871"/>
-      </p:ext>
-    </p:extLst>
-  </p:cSld>
-  <p:clrMapOvr>
-    <a:masterClrMapping/>
-  </p:clrMapOvr>
-</p:sld>
-</file>
-
-<file path=ppt/slides/slide19.xml><?xml version="1.0" encoding="utf-8"?>
-<p:sld xmlns:a="http://schemas.openxmlformats.org/drawingml/2006/main" xmlns:r="http://schemas.openxmlformats.org/officeDocument/2006/relationships" xmlns:p="http://schemas.openxmlformats.org/presentationml/2006/main">
-  <p:cSld>
-    <p:spTree>
-      <p:nvGrpSpPr>
-        <p:cNvPr id="1" name=""/>
-        <p:cNvGrpSpPr/>
-        <p:nvPr/>
-      </p:nvGrpSpPr>
-      <p:grpSpPr>
-        <a:xfrm>
-          <a:off x="0" y="0"/>
-          <a:ext cx="0" cy="0"/>
-          <a:chOff x="0" y="0"/>
-          <a:chExt cx="0" cy="0"/>
-        </a:xfrm>
-      </p:grpSpPr>
-      <p:sp>
-        <p:nvSpPr>
-          <p:cNvPr id="2" name="Title 1"/>
-          <p:cNvSpPr>
-            <a:spLocks noGrp="1"/>
-          </p:cNvSpPr>
-          <p:nvPr>
-            <p:ph type="title"/>
-          </p:nvPr>
-        </p:nvSpPr>
-        <p:spPr/>
-        <p:txBody>
-          <a:bodyPr/>
-          <a:lstStyle/>
-          <a:p>
-            <a:r>
-              <a:rPr lang="en-US" dirty="0" smtClean="0"/>
-              <a:t>Summary</a:t>
-            </a:r>
-            <a:endParaRPr lang="en-US" dirty="0"/>
-          </a:p>
-        </p:txBody>
-      </p:sp>
-      <p:sp>
-        <p:nvSpPr>
-          <p:cNvPr id="3" name="Content Placeholder 2"/>
-          <p:cNvSpPr>
-            <a:spLocks noGrp="1"/>
-          </p:cNvSpPr>
-          <p:nvPr>
-            <p:ph idx="1"/>
-          </p:nvPr>
-        </p:nvSpPr>
-        <p:spPr/>
-        <p:txBody>
-          <a:bodyPr>
-            <a:normAutofit fontScale="92500"/>
-          </a:bodyPr>
-          <a:lstStyle/>
-          <a:p>
-            <a:r>
-              <a:rPr lang="en-US" dirty="0" smtClean="0"/>
-              <a:t>European privacy efforts are great for intent and expression</a:t>
-            </a:r>
-          </a:p>
-          <a:p>
-            <a:r>
-              <a:rPr lang="en-US" dirty="0" smtClean="0"/>
-              <a:t>Twenty-five years later they still are mighty leaky</a:t>
-            </a:r>
-          </a:p>
-          <a:p>
-            <a:r>
-              <a:rPr lang="en-US" dirty="0" smtClean="0"/>
-              <a:t>They are a great platform to build on </a:t>
-            </a:r>
-            <a:r>
-              <a:rPr lang="mr-IN" dirty="0" smtClean="0"/>
-              <a:t>–</a:t>
-            </a:r>
-            <a:r>
-              <a:rPr lang="en-US" dirty="0" smtClean="0"/>
-              <a:t> but sadly it depends on the customers</a:t>
-            </a:r>
-          </a:p>
-          <a:p>
-            <a:r>
-              <a:rPr lang="en-US" dirty="0" smtClean="0"/>
-              <a:t>They need adoption, implementation, and most importantly iteration in a learning context.</a:t>
-            </a:r>
-          </a:p>
-          <a:p>
-            <a:r>
-              <a:rPr lang="en-US" dirty="0" smtClean="0"/>
-              <a:t>One reviewer said to take a look at the "</a:t>
-            </a:r>
-            <a:r>
-              <a:rPr lang="en-US" b="1" dirty="0"/>
-              <a:t>California Consumer Privacy Act of </a:t>
-            </a:r>
-            <a:r>
-              <a:rPr lang="en-US" b="1" dirty="0" smtClean="0"/>
-              <a:t>2018</a:t>
-            </a:r>
-            <a:r>
-              <a:rPr lang="en-US" dirty="0" smtClean="0"/>
-              <a:t>" </a:t>
-            </a:r>
-            <a:r>
-              <a:rPr lang="mr-IN" dirty="0" smtClean="0"/>
-              <a:t>–</a:t>
-            </a:r>
-            <a:r>
-              <a:rPr lang="en-US" dirty="0" smtClean="0"/>
-              <a:t> I agree </a:t>
-            </a:r>
-            <a:r>
-              <a:rPr lang="mr-IN" dirty="0" smtClean="0"/>
-              <a:t>–</a:t>
-            </a:r>
-            <a:r>
-              <a:rPr lang="en-US" dirty="0" smtClean="0"/>
-              <a:t> it is very interesting and warrants its own episode</a:t>
-            </a:r>
-            <a:endParaRPr lang="en-US" b="1" dirty="0"/>
           </a:p>
         </p:txBody>
       </p:sp>
@@ -5276,150 +5129,7 @@
 </p:sld>
 </file>
 
-<file path=ppt/slides/slide2.xml><?xml version="1.0" encoding="utf-8"?>
-<p:sld xmlns:a="http://schemas.openxmlformats.org/drawingml/2006/main" xmlns:r="http://schemas.openxmlformats.org/officeDocument/2006/relationships" xmlns:p="http://schemas.openxmlformats.org/presentationml/2006/main">
-  <p:cSld>
-    <p:spTree>
-      <p:nvGrpSpPr>
-        <p:cNvPr id="1" name=""/>
-        <p:cNvGrpSpPr/>
-        <p:nvPr/>
-      </p:nvGrpSpPr>
-      <p:grpSpPr>
-        <a:xfrm>
-          <a:off x="0" y="0"/>
-          <a:ext cx="0" cy="0"/>
-          <a:chOff x="0" y="0"/>
-          <a:chExt cx="0" cy="0"/>
-        </a:xfrm>
-      </p:grpSpPr>
-      <p:sp>
-        <p:nvSpPr>
-          <p:cNvPr id="2" name="Title 1"/>
-          <p:cNvSpPr>
-            <a:spLocks noGrp="1"/>
-          </p:cNvSpPr>
-          <p:nvPr>
-            <p:ph type="title"/>
-          </p:nvPr>
-        </p:nvSpPr>
-        <p:spPr/>
-        <p:txBody>
-          <a:bodyPr/>
-          <a:lstStyle/>
-          <a:p>
-            <a:r>
-              <a:rPr lang="en-US" b="1" dirty="0" smtClean="0">
-                <a:latin typeface="Calibri" panose="020F0502020204030204" pitchFamily="34" charset="0"/>
-                <a:cs typeface="Calibri" panose="020F0502020204030204" pitchFamily="34" charset="0"/>
-              </a:rPr>
-              <a:t>General Data Privacy Regulation (GDPR)</a:t>
-            </a:r>
-            <a:endParaRPr lang="en-US" b="1" dirty="0">
-              <a:latin typeface="Calibri" panose="020F0502020204030204" pitchFamily="34" charset="0"/>
-              <a:cs typeface="Calibri" panose="020F0502020204030204" pitchFamily="34" charset="0"/>
-            </a:endParaRPr>
-          </a:p>
-        </p:txBody>
-      </p:sp>
-      <p:sp>
-        <p:nvSpPr>
-          <p:cNvPr id="3" name="Content Placeholder 2"/>
-          <p:cNvSpPr>
-            <a:spLocks noGrp="1"/>
-          </p:cNvSpPr>
-          <p:nvPr>
-            <p:ph idx="1"/>
-          </p:nvPr>
-        </p:nvSpPr>
-        <p:spPr>
-          <a:xfrm>
-            <a:off x="838200" y="1825625"/>
-            <a:ext cx="9034220" cy="3598099"/>
-          </a:xfrm>
-        </p:spPr>
-        <p:txBody>
-          <a:bodyPr>
-            <a:normAutofit/>
-          </a:bodyPr>
-          <a:lstStyle/>
-          <a:p>
-            <a:pPr>
-              <a:buClr>
-                <a:srgbClr val="FF0000"/>
-              </a:buClr>
-            </a:pPr>
-            <a:r>
-              <a:rPr lang="en-US" sz="4400" dirty="0" smtClean="0"/>
-              <a:t>EU Law in 2016 </a:t>
-            </a:r>
-            <a:r>
-              <a:rPr lang="mr-IN" sz="4400" dirty="0" smtClean="0"/>
-              <a:t>–</a:t>
-            </a:r>
-            <a:r>
-              <a:rPr lang="en-US" sz="4400" dirty="0" smtClean="0"/>
-              <a:t> in effect 2018</a:t>
-            </a:r>
-          </a:p>
-          <a:p>
-            <a:pPr>
-              <a:buClr>
-                <a:srgbClr val="FF0000"/>
-              </a:buClr>
-            </a:pPr>
-            <a:r>
-              <a:rPr lang="en-US" sz="4000" b="1" dirty="0"/>
-              <a:t>International Safe Harbor Privacy </a:t>
-            </a:r>
-            <a:r>
-              <a:rPr lang="en-US" sz="4000" b="1" dirty="0" smtClean="0"/>
-              <a:t>Principles</a:t>
-            </a:r>
-            <a:r>
-              <a:rPr lang="en-US" sz="4000" dirty="0"/>
-              <a:t> </a:t>
-            </a:r>
-            <a:r>
-              <a:rPr lang="en-US" sz="4000" dirty="0" smtClean="0"/>
-              <a:t>(2000) </a:t>
-            </a:r>
-          </a:p>
-          <a:p>
-            <a:pPr>
-              <a:buClr>
-                <a:srgbClr val="FF0000"/>
-              </a:buClr>
-            </a:pPr>
-            <a:r>
-              <a:rPr lang="en-US" sz="4000" b="1" dirty="0" smtClean="0"/>
-              <a:t>EU Data Protection Directive (1995)</a:t>
-            </a:r>
-            <a:endParaRPr lang="en-US" sz="4000" b="1" dirty="0"/>
-          </a:p>
-        </p:txBody>
-      </p:sp>
-    </p:spTree>
-    <p:extLst>
-      <p:ext uri="{BB962C8B-B14F-4D97-AF65-F5344CB8AC3E}">
-        <p14:creationId xmlns:p14="http://schemas.microsoft.com/office/powerpoint/2010/main" val="1325381325"/>
-      </p:ext>
-    </p:extLst>
-  </p:cSld>
-  <p:clrMapOvr>
-    <a:masterClrMapping/>
-  </p:clrMapOvr>
-  <p:timing>
-    <p:tnLst>
-      <p:par>
-        <p:cTn id="1" dur="indefinite" restart="never" nodeType="tmRoot"/>
-      </p:par>
-    </p:tnLst>
-  </p:timing>
-</p:sld>
-</file>
-
-<file path=ppt/slides/slide20.xml><?xml version="1.0" encoding="utf-8"?>
+<file path=ppt/slides/slide19.xml><?xml version="1.0" encoding="utf-8"?>
 <p:sld xmlns:a="http://schemas.openxmlformats.org/drawingml/2006/main" xmlns:r="http://schemas.openxmlformats.org/officeDocument/2006/relationships" xmlns:p="http://schemas.openxmlformats.org/presentationml/2006/main" showMasterSp="0">
   <p:cSld>
     <p:spTree>
@@ -5553,6 +5263,120 @@
 </p:sld>
 </file>
 
+<file path=ppt/slides/slide2.xml><?xml version="1.0" encoding="utf-8"?>
+<p:sld xmlns:a="http://schemas.openxmlformats.org/drawingml/2006/main" xmlns:r="http://schemas.openxmlformats.org/officeDocument/2006/relationships" xmlns:p="http://schemas.openxmlformats.org/presentationml/2006/main">
+  <p:cSld>
+    <p:spTree>
+      <p:nvGrpSpPr>
+        <p:cNvPr id="1" name=""/>
+        <p:cNvGrpSpPr/>
+        <p:nvPr/>
+      </p:nvGrpSpPr>
+      <p:grpSpPr>
+        <a:xfrm>
+          <a:off x="0" y="0"/>
+          <a:ext cx="0" cy="0"/>
+          <a:chOff x="0" y="0"/>
+          <a:chExt cx="0" cy="0"/>
+        </a:xfrm>
+      </p:grpSpPr>
+      <p:sp>
+        <p:nvSpPr>
+          <p:cNvPr id="2" name="Title 1"/>
+          <p:cNvSpPr>
+            <a:spLocks noGrp="1"/>
+          </p:cNvSpPr>
+          <p:nvPr>
+            <p:ph type="title"/>
+          </p:nvPr>
+        </p:nvSpPr>
+        <p:spPr/>
+        <p:txBody>
+          <a:bodyPr/>
+          <a:lstStyle/>
+          <a:p>
+            <a:r>
+              <a:rPr lang="en-US" dirty="0" smtClean="0"/>
+              <a:t>Two Podcasts	</a:t>
+            </a:r>
+            <a:endParaRPr lang="en-US" dirty="0"/>
+          </a:p>
+        </p:txBody>
+      </p:sp>
+      <p:sp>
+        <p:nvSpPr>
+          <p:cNvPr id="3" name="Content Placeholder 2"/>
+          <p:cNvSpPr>
+            <a:spLocks noGrp="1"/>
+          </p:cNvSpPr>
+          <p:nvPr>
+            <p:ph idx="1"/>
+          </p:nvPr>
+        </p:nvSpPr>
+        <p:spPr/>
+        <p:txBody>
+          <a:bodyPr>
+            <a:normAutofit/>
+          </a:bodyPr>
+          <a:lstStyle/>
+          <a:p>
+            <a:r>
+              <a:rPr lang="en-US" sz="4000" dirty="0"/>
+              <a:t>Highly critical of how </a:t>
+            </a:r>
+            <a:r>
+              <a:rPr lang="en-US" sz="4000" dirty="0" smtClean="0"/>
+              <a:t>GDPR </a:t>
+            </a:r>
+            <a:r>
+              <a:rPr lang="en-US" sz="4000" dirty="0"/>
+              <a:t>is </a:t>
+            </a:r>
+            <a:r>
+              <a:rPr lang="en-US" sz="4000" dirty="0" smtClean="0"/>
+              <a:t>used</a:t>
+            </a:r>
+          </a:p>
+          <a:p>
+            <a:r>
+              <a:rPr lang="en-US" sz="4000" dirty="0" smtClean="0"/>
+              <a:t>Complimentary </a:t>
+            </a:r>
+            <a:r>
+              <a:rPr lang="en-US" sz="4000" dirty="0"/>
+              <a:t>about </a:t>
+            </a:r>
+            <a:r>
+              <a:rPr lang="en-US" sz="4000" dirty="0" smtClean="0"/>
+              <a:t>what GDPR intends to be</a:t>
+            </a:r>
+            <a:endParaRPr lang="en-US" sz="4000" dirty="0" smtClean="0"/>
+          </a:p>
+          <a:p>
+            <a:endParaRPr lang="en-US" sz="4000" dirty="0" smtClean="0"/>
+          </a:p>
+        </p:txBody>
+      </p:sp>
+    </p:spTree>
+    <p:extLst>
+      <p:ext uri="{BB962C8B-B14F-4D97-AF65-F5344CB8AC3E}">
+        <p14:creationId xmlns:p14="http://schemas.microsoft.com/office/powerpoint/2010/main" val="365180503"/>
+      </p:ext>
+    </p:extLst>
+  </p:cSld>
+  <p:clrMapOvr>
+    <a:masterClrMapping/>
+  </p:clrMapOvr>
+  <p:timing>
+    <p:tnLst>
+      <p:par>
+        <p:cTn id="1" dur="indefinite" restart="never" nodeType="tmRoot"/>
+      </p:par>
+    </p:tnLst>
+  </p:timing>
+</p:sld>
+</file>
+
 <file path=ppt/slides/slide3.xml><?xml version="1.0" encoding="utf-8"?>
 <p:sld xmlns:a="http://schemas.openxmlformats.org/drawingml/2006/main" xmlns:r="http://schemas.openxmlformats.org/officeDocument/2006/relationships" xmlns:p="http://schemas.openxmlformats.org/presentationml/2006/main">
   <p:cSld>
@@ -5586,14 +5410,16 @@
           <a:lstStyle/>
           <a:p>
             <a:r>
-              <a:rPr lang="en-US" dirty="0"/>
-              <a:t>EU Data Protection Directive (1995</a:t>
-            </a:r>
-            <a:r>
-              <a:rPr lang="en-US" dirty="0" smtClean="0"/>
-              <a:t>)</a:t>
-            </a:r>
-            <a:endParaRPr lang="en-US" dirty="0"/>
+              <a:rPr lang="en-US" b="1" dirty="0" smtClean="0">
+                <a:latin typeface="Calibri" panose="020F0502020204030204" pitchFamily="34" charset="0"/>
+                <a:cs typeface="Calibri" panose="020F0502020204030204" pitchFamily="34" charset="0"/>
+              </a:rPr>
+              <a:t>General Data Privacy Regulation (GDPR)</a:t>
+            </a:r>
+            <a:endParaRPr lang="en-US" b="1" dirty="0">
+              <a:latin typeface="Calibri" panose="020F0502020204030204" pitchFamily="34" charset="0"/>
+              <a:cs typeface="Calibri" panose="020F0502020204030204" pitchFamily="34" charset="0"/>
+            </a:endParaRPr>
           </a:p>
         </p:txBody>
       </p:sp>
@@ -5607,76 +5433,90 @@
             <p:ph idx="1"/>
           </p:nvPr>
         </p:nvSpPr>
-        <p:spPr/>
+        <p:spPr>
+          <a:xfrm>
+            <a:off x="838200" y="1825625"/>
+            <a:ext cx="9034220" cy="3598099"/>
+          </a:xfrm>
+        </p:spPr>
         <p:txBody>
           <a:bodyPr>
             <a:normAutofit/>
           </a:bodyPr>
           <a:lstStyle/>
           <a:p>
-            <a:r>
-              <a:rPr lang="en-US" dirty="0"/>
-              <a:t>Notice—data subjects should be given notice when their data is being </a:t>
-            </a:r>
-            <a:r>
-              <a:rPr lang="en-US" dirty="0" smtClean="0"/>
-              <a:t>collected</a:t>
-            </a:r>
-          </a:p>
-          <a:p>
-            <a:r>
-              <a:rPr lang="en-US" dirty="0" smtClean="0"/>
-              <a:t>Purpose—data </a:t>
-            </a:r>
-            <a:r>
-              <a:rPr lang="en-US" dirty="0"/>
-              <a:t>should only be used for the purpose stated and not for any other </a:t>
-            </a:r>
-            <a:r>
-              <a:rPr lang="en-US" dirty="0" smtClean="0"/>
-              <a:t>purposes</a:t>
-            </a:r>
-          </a:p>
-          <a:p>
-            <a:r>
-              <a:rPr lang="en-US" dirty="0" smtClean="0"/>
-              <a:t>Consent—data </a:t>
-            </a:r>
-            <a:r>
-              <a:rPr lang="en-US" dirty="0"/>
-              <a:t>should not be disclosed without the data subject’s </a:t>
-            </a:r>
-            <a:r>
-              <a:rPr lang="en-US" dirty="0" smtClean="0"/>
-              <a:t>consent</a:t>
-            </a:r>
-          </a:p>
-          <a:p>
-            <a:r>
-              <a:rPr lang="en-US" dirty="0" smtClean="0"/>
-              <a:t>Security—collected </a:t>
-            </a:r>
-            <a:r>
-              <a:rPr lang="en-US" dirty="0"/>
-              <a:t>data should be kept secure from any potential </a:t>
-            </a:r>
-            <a:r>
-              <a:rPr lang="en-US" dirty="0" smtClean="0"/>
-              <a:t>abuses</a:t>
-            </a:r>
+            <a:pPr>
+              <a:buClr>
+                <a:srgbClr val="FF0000"/>
+              </a:buClr>
+            </a:pPr>
+            <a:r>
+              <a:rPr lang="en-US" sz="4400" dirty="0" smtClean="0"/>
+              <a:t>EU Law in 2016 </a:t>
+            </a:r>
+            <a:r>
+              <a:rPr lang="mr-IN" sz="4400" dirty="0" smtClean="0"/>
+              <a:t>–</a:t>
+            </a:r>
+            <a:r>
+              <a:rPr lang="en-US" sz="4400" dirty="0" smtClean="0"/>
+              <a:t> in effect 2018</a:t>
+            </a:r>
+          </a:p>
+          <a:p>
+            <a:pPr>
+              <a:buClr>
+                <a:srgbClr val="FF0000"/>
+              </a:buClr>
+            </a:pPr>
+            <a:r>
+              <a:rPr lang="en-US" sz="4000" b="1" dirty="0"/>
+              <a:t>International Safe Harbor Privacy </a:t>
+            </a:r>
+            <a:r>
+              <a:rPr lang="en-US" sz="4000" b="1" dirty="0" smtClean="0"/>
+              <a:t>Principles</a:t>
+            </a:r>
+            <a:r>
+              <a:rPr lang="en-US" sz="4000" dirty="0"/>
+              <a:t> </a:t>
+            </a:r>
+            <a:r>
+              <a:rPr lang="en-US" sz="4000" dirty="0" smtClean="0"/>
+              <a:t>(2000) </a:t>
+            </a:r>
+          </a:p>
+          <a:p>
+            <a:pPr>
+              <a:buClr>
+                <a:srgbClr val="FF0000"/>
+              </a:buClr>
+            </a:pPr>
+            <a:r>
+              <a:rPr lang="en-US" sz="4000" b="1" dirty="0" smtClean="0"/>
+              <a:t>EU Data Protection Directive (1995)</a:t>
+            </a:r>
+            <a:endParaRPr lang="en-US" sz="4000" b="1" dirty="0"/>
           </a:p>
         </p:txBody>
       </p:sp>
     </p:spTree>
     <p:extLst>
       <p:ext uri="{BB962C8B-B14F-4D97-AF65-F5344CB8AC3E}">
-        <p14:creationId xmlns:p14="http://schemas.microsoft.com/office/powerpoint/2010/main" val="1061902949"/>
+        <p14:creationId xmlns:p14="http://schemas.microsoft.com/office/powerpoint/2010/main" val="1325381325"/>
       </p:ext>
     </p:extLst>
   </p:cSld>
   <p:clrMapOvr>
     <a:masterClrMapping/>
   </p:clrMapOvr>
+  <p:timing>
+    <p:tnLst>
+      <p:par>
+        <p:cTn id="1" dur="indefinite" restart="never" nodeType="tmRoot"/>
+      </p:par>
+    </p:tnLst>
+  </p:timing>
 </p:sld>
 </file>
 
@@ -5713,11 +5553,11 @@
           <a:lstStyle/>
           <a:p>
             <a:r>
-              <a:rPr lang="en-US"/>
+              <a:rPr lang="en-US" dirty="0"/>
               <a:t>EU Data Protection Directive (1995</a:t>
             </a:r>
             <a:r>
-              <a:rPr lang="en-US" smtClean="0"/>
+              <a:rPr lang="en-US" dirty="0" smtClean="0"/>
               <a:t>)</a:t>
             </a:r>
             <a:endParaRPr lang="en-US" dirty="0"/>
@@ -5742,54 +5582,113 @@
           <a:lstStyle/>
           <a:p>
             <a:r>
-              <a:rPr lang="en-US" dirty="0" smtClean="0"/>
-              <a:t>Disclosure—data </a:t>
-            </a:r>
-            <a:r>
               <a:rPr lang="en-US" dirty="0"/>
-              <a:t>subjects should be informed as to who is collecting their </a:t>
-            </a:r>
-            <a:r>
-              <a:rPr lang="en-US" dirty="0" smtClean="0"/>
-              <a:t>data</a:t>
-            </a:r>
-          </a:p>
-          <a:p>
-            <a:r>
-              <a:rPr lang="en-US" dirty="0" smtClean="0"/>
-              <a:t>Access—data </a:t>
+              <a:t>Notice—data subjects should be given notice when their data is being </a:t>
+            </a:r>
+            <a:r>
+              <a:rPr lang="en-US" dirty="0" smtClean="0"/>
+              <a:t>collected</a:t>
+            </a:r>
+          </a:p>
+          <a:p>
+            <a:r>
+              <a:rPr lang="en-US" dirty="0" smtClean="0"/>
+              <a:t>Purpose—data </a:t>
             </a:r>
             <a:r>
               <a:rPr lang="en-US" dirty="0"/>
-              <a:t>subjects should be allowed to access their data and make corrections to any inaccurate </a:t>
-            </a:r>
-            <a:r>
-              <a:rPr lang="en-US" dirty="0" smtClean="0"/>
-              <a:t>data</a:t>
-            </a:r>
-          </a:p>
-          <a:p>
-            <a:r>
-              <a:rPr lang="en-US" dirty="0" smtClean="0"/>
-              <a:t>Accountability—data </a:t>
+              <a:t>should only be used for the purpose stated and not for any other </a:t>
+            </a:r>
+            <a:r>
+              <a:rPr lang="en-US" dirty="0" smtClean="0"/>
+              <a:t>purposes</a:t>
+            </a:r>
+          </a:p>
+          <a:p>
+            <a:r>
+              <a:rPr lang="en-US" dirty="0" smtClean="0"/>
+              <a:t>Consent—data </a:t>
             </a:r>
             <a:r>
               <a:rPr lang="en-US" dirty="0"/>
-              <a:t>subjects should have a method available to them to hold data collectors accountable for not following the above principles</a:t>
-            </a:r>
+              <a:t>should not be disclosed without the data subject’s </a:t>
+            </a:r>
+            <a:r>
+              <a:rPr lang="en-US" dirty="0" smtClean="0"/>
+              <a:t>consent</a:t>
+            </a:r>
+          </a:p>
+          <a:p>
+            <a:r>
+              <a:rPr lang="en-US" dirty="0" smtClean="0"/>
+              <a:t>Security—collected </a:t>
+            </a:r>
+            <a:r>
+              <a:rPr lang="en-US" dirty="0"/>
+              <a:t>data should be kept secure from any potential </a:t>
+            </a:r>
+            <a:r>
+              <a:rPr lang="en-US" dirty="0" smtClean="0"/>
+              <a:t>abuses</a:t>
+            </a:r>
+          </a:p>
+        </p:txBody>
+      </p:sp>
+      <p:sp>
+        <p:nvSpPr>
+          <p:cNvPr id="4" name="TextBox 3"/>
+          <p:cNvSpPr txBox="1"/>
+          <p:nvPr/>
+        </p:nvSpPr>
+        <p:spPr>
+          <a:xfrm>
+            <a:off x="10012101" y="6319777"/>
+            <a:ext cx="649537" cy="369332"/>
+          </a:xfrm>
+          <a:prstGeom prst="rect">
+            <a:avLst/>
+          </a:prstGeom>
+          <a:noFill/>
+        </p:spPr>
+        <p:txBody>
+          <a:bodyPr wrap="none" rtlCol="0">
+            <a:spAutoFit/>
+          </a:bodyPr>
+          <a:lstStyle/>
+          <a:p>
+            <a:r>
+              <a:rPr lang="en-US" dirty="0" smtClean="0">
+                <a:solidFill>
+                  <a:schemeClr val="bg1"/>
+                </a:solidFill>
+              </a:rPr>
+              <a:t>(1/2)</a:t>
+            </a:r>
+            <a:endParaRPr lang="en-US" dirty="0">
+              <a:solidFill>
+                <a:schemeClr val="bg1"/>
+              </a:solidFill>
+            </a:endParaRPr>
           </a:p>
         </p:txBody>
       </p:sp>
     </p:spTree>
     <p:extLst>
       <p:ext uri="{BB962C8B-B14F-4D97-AF65-F5344CB8AC3E}">
-        <p14:creationId xmlns:p14="http://schemas.microsoft.com/office/powerpoint/2010/main" val="332459177"/>
+        <p14:creationId xmlns:p14="http://schemas.microsoft.com/office/powerpoint/2010/main" val="1061902949"/>
       </p:ext>
     </p:extLst>
   </p:cSld>
   <p:clrMapOvr>
     <a:masterClrMapping/>
   </p:clrMapOvr>
+  <p:timing>
+    <p:tnLst>
+      <p:par>
+        <p:cTn id="1" dur="indefinite" restart="never" nodeType="tmRoot"/>
+      </p:par>
+    </p:tnLst>
+  </p:timing>
 </p:sld>
 </file>
 
@@ -5812,7 +5711,7 @@
       </p:grpSpPr>
       <p:sp>
         <p:nvSpPr>
-          <p:cNvPr id="4" name="Title 3"/>
+          <p:cNvPr id="2" name="Title 1"/>
           <p:cNvSpPr>
             <a:spLocks noGrp="1"/>
           </p:cNvSpPr>
@@ -5826,8 +5725,12 @@
           <a:lstStyle/>
           <a:p>
             <a:r>
-              <a:rPr lang="en-US" dirty="0" smtClean="0"/>
-              <a:t>What could possibly go wrong?</a:t>
+              <a:rPr lang="en-US"/>
+              <a:t>EU Data Protection Directive (1995</a:t>
+            </a:r>
+            <a:r>
+              <a:rPr lang="en-US" smtClean="0"/>
+              <a:t>)</a:t>
             </a:r>
             <a:endParaRPr lang="en-US" dirty="0"/>
           </a:p>
@@ -5835,14 +5738,70 @@
       </p:sp>
       <p:sp>
         <p:nvSpPr>
-          <p:cNvPr id="5" name="TextBox 4"/>
+          <p:cNvPr id="3" name="Content Placeholder 2"/>
+          <p:cNvSpPr>
+            <a:spLocks noGrp="1"/>
+          </p:cNvSpPr>
+          <p:nvPr>
+            <p:ph idx="1"/>
+          </p:nvPr>
+        </p:nvSpPr>
+        <p:spPr/>
+        <p:txBody>
+          <a:bodyPr>
+            <a:normAutofit/>
+          </a:bodyPr>
+          <a:lstStyle/>
+          <a:p>
+            <a:r>
+              <a:rPr lang="en-US" dirty="0" smtClean="0"/>
+              <a:t>Disclosure—data </a:t>
+            </a:r>
+            <a:r>
+              <a:rPr lang="en-US" dirty="0"/>
+              <a:t>subjects should be informed as to who is collecting their </a:t>
+            </a:r>
+            <a:r>
+              <a:rPr lang="en-US" dirty="0" smtClean="0"/>
+              <a:t>data</a:t>
+            </a:r>
+          </a:p>
+          <a:p>
+            <a:r>
+              <a:rPr lang="en-US" dirty="0" smtClean="0"/>
+              <a:t>Access—data </a:t>
+            </a:r>
+            <a:r>
+              <a:rPr lang="en-US" dirty="0"/>
+              <a:t>subjects should be allowed to access their data and make corrections to any inaccurate </a:t>
+            </a:r>
+            <a:r>
+              <a:rPr lang="en-US" dirty="0" smtClean="0"/>
+              <a:t>data</a:t>
+            </a:r>
+          </a:p>
+          <a:p>
+            <a:r>
+              <a:rPr lang="en-US" dirty="0" smtClean="0"/>
+              <a:t>Accountability—data </a:t>
+            </a:r>
+            <a:r>
+              <a:rPr lang="en-US" dirty="0"/>
+              <a:t>subjects should have a method available to them to hold data collectors accountable for not following the above principles</a:t>
+            </a:r>
+          </a:p>
+        </p:txBody>
+      </p:sp>
+      <p:sp>
+        <p:nvSpPr>
+          <p:cNvPr id="4" name="TextBox 3"/>
           <p:cNvSpPr txBox="1"/>
           <p:nvPr/>
         </p:nvSpPr>
         <p:spPr>
           <a:xfrm>
-            <a:off x="1025610" y="1690688"/>
-            <a:ext cx="9796849" cy="3046988"/>
+            <a:off x="10012101" y="6319777"/>
+            <a:ext cx="649537" cy="369332"/>
           </a:xfrm>
           <a:prstGeom prst="rect">
             <a:avLst/>
@@ -5850,155 +5809,18 @@
           <a:noFill/>
         </p:spPr>
         <p:txBody>
-          <a:bodyPr wrap="square" rtlCol="0">
+          <a:bodyPr wrap="none" rtlCol="0">
             <a:spAutoFit/>
           </a:bodyPr>
           <a:lstStyle/>
           <a:p>
             <a:r>
-              <a:rPr lang="en-US" sz="3200" dirty="0">
+              <a:rPr lang="en-US" dirty="0" smtClean="0">
                 <a:solidFill>
                   <a:schemeClr val="bg1"/>
                 </a:solidFill>
               </a:rPr>
-              <a:t>The </a:t>
-            </a:r>
-            <a:r>
-              <a:rPr lang="en-US" sz="3200" dirty="0">
-                <a:hlinkClick r:id="rId2" tooltip="Organisation for Economic Co-operation and Development"/>
-              </a:rPr>
-              <a:t>Organisation for Economic Co-operation and Development</a:t>
-            </a:r>
-            <a:r>
-              <a:rPr lang="en-US" sz="3200" dirty="0"/>
-              <a:t> </a:t>
-            </a:r>
-            <a:r>
-              <a:rPr lang="en-US" sz="3200" dirty="0">
-                <a:solidFill>
-                  <a:schemeClr val="bg1"/>
-                </a:solidFill>
-              </a:rPr>
-              <a:t>(OECD</a:t>
-            </a:r>
-            <a:r>
-              <a:rPr lang="en-US" sz="3200" dirty="0" smtClean="0">
-                <a:solidFill>
-                  <a:schemeClr val="bg1"/>
-                </a:solidFill>
-              </a:rPr>
-              <a:t>) guidelines</a:t>
-            </a:r>
-            <a:r>
-              <a:rPr lang="en-US" sz="3200" dirty="0">
-                <a:solidFill>
-                  <a:schemeClr val="bg1"/>
-                </a:solidFill>
-              </a:rPr>
-              <a:t>, however, were non-binding, and </a:t>
-            </a:r>
-            <a:r>
-              <a:rPr lang="en-US" sz="3200" dirty="0">
-                <a:solidFill>
-                  <a:schemeClr val="bg1"/>
-                </a:solidFill>
-                <a:hlinkClick r:id="rId3" tooltip="Data privacy"/>
-              </a:rPr>
-              <a:t>data privacy</a:t>
-            </a:r>
-            <a:r>
-              <a:rPr lang="en-US" sz="3200" dirty="0">
-                <a:solidFill>
-                  <a:schemeClr val="bg1"/>
-                </a:solidFill>
-              </a:rPr>
-              <a:t> laws still varied widely across Europe. The United States, meanwhile, while endorsing the </a:t>
-            </a:r>
-            <a:r>
-              <a:rPr lang="en-US" sz="3200" dirty="0">
-                <a:solidFill>
-                  <a:schemeClr val="bg1"/>
-                </a:solidFill>
-                <a:hlinkClick r:id="rId4" tooltip="OECD"/>
-              </a:rPr>
-              <a:t>OECD</a:t>
-            </a:r>
-            <a:r>
-              <a:rPr lang="en-US" sz="3200" dirty="0">
-                <a:solidFill>
-                  <a:schemeClr val="bg1"/>
-                </a:solidFill>
-              </a:rPr>
-              <a:t>'s recommendations, did nothing to implement them within the United </a:t>
-            </a:r>
-            <a:r>
-              <a:rPr lang="en-US" sz="3200" dirty="0" smtClean="0">
-                <a:solidFill>
-                  <a:schemeClr val="bg1"/>
-                </a:solidFill>
-              </a:rPr>
-              <a:t>States.</a:t>
-            </a:r>
-            <a:endParaRPr lang="en-US" sz="3200" dirty="0">
-              <a:solidFill>
-                <a:schemeClr val="bg1"/>
-              </a:solidFill>
-            </a:endParaRPr>
-          </a:p>
-        </p:txBody>
-      </p:sp>
-      <p:sp>
-        <p:nvSpPr>
-          <p:cNvPr id="6" name="Rectangle 5"/>
-          <p:cNvSpPr/>
-          <p:nvPr/>
-        </p:nvSpPr>
-        <p:spPr>
-          <a:xfrm>
-            <a:off x="4336801" y="6086388"/>
-            <a:ext cx="5495479" cy="369332"/>
-          </a:xfrm>
-          <a:prstGeom prst="rect">
-            <a:avLst/>
-          </a:prstGeom>
-        </p:spPr>
-        <p:txBody>
-          <a:bodyPr wrap="none">
-            <a:spAutoFit/>
-          </a:bodyPr>
-          <a:lstStyle/>
-          <a:p>
-            <a:r>
-              <a:rPr lang="en-US" dirty="0">
-                <a:solidFill>
-                  <a:schemeClr val="bg1"/>
-                </a:solidFill>
-              </a:rPr>
-              <a:t>https://</a:t>
-            </a:r>
-            <a:r>
-              <a:rPr lang="en-US" dirty="0" err="1">
-                <a:solidFill>
-                  <a:schemeClr val="bg1"/>
-                </a:solidFill>
-              </a:rPr>
-              <a:t>en.wikipedia.org</a:t>
-            </a:r>
-            <a:r>
-              <a:rPr lang="en-US" dirty="0">
-                <a:solidFill>
-                  <a:schemeClr val="bg1"/>
-                </a:solidFill>
-              </a:rPr>
-              <a:t>/wiki/</a:t>
-            </a:r>
-            <a:r>
-              <a:rPr lang="en-US" dirty="0" err="1">
-                <a:solidFill>
-                  <a:schemeClr val="bg1"/>
-                </a:solidFill>
-              </a:rPr>
-              <a:t>Data_Protection_Directive</a:t>
+              <a:t>(2/2)</a:t>
             </a:r>
             <a:endParaRPr lang="en-US" dirty="0">
               <a:solidFill>
@@ -6011,13 +5833,20 @@
     </p:spTree>
     <p:extLst>
       <p:ext uri="{BB962C8B-B14F-4D97-AF65-F5344CB8AC3E}">
-        <p14:creationId xmlns:p14="http://schemas.microsoft.com/office/powerpoint/2010/main" val="89792983"/>
+        <p14:creationId xmlns:p14="http://schemas.microsoft.com/office/powerpoint/2010/main" val="332459177"/>
       </p:ext>
     </p:extLst>
   </p:cSld>
   <p:clrMapOvr>
     <a:masterClrMapping/>
   </p:clrMapOvr>
+  <p:timing>
+    <p:tnLst>
+      <p:par>
+        <p:cTn id="1" dur="indefinite" restart="never" nodeType="tmRoot"/>
+      </p:par>
+    </p:tnLst>
+  </p:timing>
 </p:sld>
 </file>
 
@@ -6040,7 +5869,7 @@
       </p:grpSpPr>
       <p:sp>
         <p:nvSpPr>
-          <p:cNvPr id="2" name="Title 1"/>
+          <p:cNvPr id="4" name="Title 3"/>
           <p:cNvSpPr>
             <a:spLocks noGrp="1"/>
           </p:cNvSpPr>
@@ -6055,7 +5884,7 @@
           <a:p>
             <a:r>
               <a:rPr lang="en-US" dirty="0" smtClean="0"/>
-              <a:t>International Safe Harbor Privacy Principles</a:t>
+              <a:t>Most Records Were in Filing Cabinets!</a:t>
             </a:r>
             <a:endParaRPr lang="en-US" dirty="0"/>
           </a:p>
@@ -6063,84 +5892,116 @@
       </p:sp>
       <p:sp>
         <p:nvSpPr>
-          <p:cNvPr id="3" name="Content Placeholder 2"/>
-          <p:cNvSpPr>
-            <a:spLocks noGrp="1"/>
-          </p:cNvSpPr>
-          <p:nvPr>
-            <p:ph idx="1"/>
-          </p:nvPr>
-        </p:nvSpPr>
-        <p:spPr/>
-        <p:txBody>
-          <a:bodyPr/>
-          <a:lstStyle/>
-          <a:p>
-            <a:r>
-              <a:rPr lang="en-US" dirty="0" smtClean="0"/>
-              <a:t>Around 2000</a:t>
-            </a:r>
-          </a:p>
-          <a:p>
-            <a:r>
-              <a:rPr lang="en-US" dirty="0" smtClean="0"/>
-              <a:t>Addressed issues surrounding US companies holding private data of EU citizens</a:t>
-            </a:r>
-          </a:p>
-          <a:p>
-            <a:r>
-              <a:rPr lang="en-US" dirty="0" smtClean="0"/>
-              <a:t>Not just learning data </a:t>
-            </a:r>
-            <a:r>
-              <a:rPr lang="mr-IN" dirty="0" smtClean="0"/>
-              <a:t>–</a:t>
-            </a:r>
-            <a:r>
-              <a:rPr lang="en-US" dirty="0" smtClean="0"/>
-              <a:t> Facebook, Twitter, Google, etc.</a:t>
-            </a:r>
-          </a:p>
-          <a:p>
-            <a:r>
-              <a:rPr lang="en-US" dirty="0" smtClean="0"/>
-              <a:t>They twisted the EU into legal knots and it was overturned in 2015</a:t>
-            </a:r>
-          </a:p>
-          <a:p>
-            <a:r>
-              <a:rPr lang="en-US" dirty="0" smtClean="0"/>
-              <a:t>Ironically </a:t>
-            </a:r>
-            <a:r>
-              <a:rPr lang="mr-IN" dirty="0" smtClean="0"/>
-              <a:t>–</a:t>
-            </a:r>
-            <a:r>
-              <a:rPr lang="en-US" dirty="0" smtClean="0"/>
-              <a:t> 20 years after the OECD Privacy Directive (LMAO)</a:t>
-            </a:r>
-            <a:endParaRPr lang="en-US" dirty="0"/>
-          </a:p>
-        </p:txBody>
-      </p:sp>
-      <p:sp>
-        <p:nvSpPr>
-          <p:cNvPr id="4" name="Rectangle 3"/>
-          <p:cNvSpPr/>
+          <p:cNvPr id="5" name="TextBox 4"/>
+          <p:cNvSpPr txBox="1"/>
           <p:nvPr/>
         </p:nvSpPr>
         <p:spPr>
           <a:xfrm>
-            <a:off x="3663778" y="5873749"/>
-            <a:ext cx="7690022" cy="369332"/>
+            <a:off x="1025610" y="1690688"/>
+            <a:ext cx="9796849" cy="2062103"/>
           </a:xfrm>
           <a:prstGeom prst="rect">
             <a:avLst/>
           </a:prstGeom>
-        </p:spPr>
-        <p:txBody>
-          <a:bodyPr wrap="square">
+          <a:noFill/>
+        </p:spPr>
+        <p:txBody>
+          <a:bodyPr wrap="square" rtlCol="0">
+            <a:spAutoFit/>
+          </a:bodyPr>
+          <a:lstStyle/>
+          <a:p>
+            <a:r>
+              <a:rPr lang="en-US" sz="3200" dirty="0" smtClean="0">
+                <a:solidFill>
+                  <a:schemeClr val="bg1"/>
+                </a:solidFill>
+              </a:rPr>
+              <a:t>These were non-binding guidelines</a:t>
+            </a:r>
+            <a:r>
+              <a:rPr lang="en-US" sz="3200" dirty="0">
+                <a:solidFill>
+                  <a:schemeClr val="bg1"/>
+                </a:solidFill>
+              </a:rPr>
+              <a:t>, </a:t>
+            </a:r>
+            <a:r>
+              <a:rPr lang="en-US" sz="3200" dirty="0" smtClean="0">
+                <a:solidFill>
+                  <a:schemeClr val="bg1"/>
+                </a:solidFill>
+              </a:rPr>
+              <a:t>and </a:t>
+            </a:r>
+            <a:r>
+              <a:rPr lang="en-US" sz="3200" dirty="0">
+                <a:solidFill>
+                  <a:schemeClr val="bg1"/>
+                </a:solidFill>
+                <a:hlinkClick r:id="rId2" tooltip="Data privacy"/>
+              </a:rPr>
+              <a:t>data privacy</a:t>
+            </a:r>
+            <a:r>
+              <a:rPr lang="en-US" sz="3200" dirty="0">
+                <a:solidFill>
+                  <a:schemeClr val="bg1"/>
+                </a:solidFill>
+              </a:rPr>
+              <a:t> laws still varied widely across Europe. The United </a:t>
+            </a:r>
+            <a:r>
+              <a:rPr lang="en-US" sz="3200" dirty="0" smtClean="0">
+                <a:solidFill>
+                  <a:schemeClr val="bg1"/>
+                </a:solidFill>
+              </a:rPr>
+              <a:t>States applied the principles to government-held data on individuals </a:t>
+            </a:r>
+            <a:r>
+              <a:rPr lang="mr-IN" sz="3200" dirty="0" smtClean="0">
+                <a:solidFill>
+                  <a:schemeClr val="bg1"/>
+                </a:solidFill>
+              </a:rPr>
+              <a:t>–</a:t>
+            </a:r>
+            <a:r>
+              <a:rPr lang="en-US" sz="3200" dirty="0" smtClean="0">
+                <a:solidFill>
+                  <a:schemeClr val="bg1"/>
+                </a:solidFill>
+              </a:rPr>
+              <a:t> but there were no cloud vendors in 1995.</a:t>
+            </a:r>
+            <a:endParaRPr lang="en-US" sz="3200" dirty="0">
+              <a:solidFill>
+                <a:schemeClr val="bg1"/>
+              </a:solidFill>
+            </a:endParaRPr>
+          </a:p>
+        </p:txBody>
+      </p:sp>
+      <p:sp>
+        <p:nvSpPr>
+          <p:cNvPr id="6" name="Rectangle 5"/>
+          <p:cNvSpPr/>
+          <p:nvPr/>
+        </p:nvSpPr>
+        <p:spPr>
+          <a:xfrm>
+            <a:off x="4336801" y="6086388"/>
+            <a:ext cx="5495479" cy="369332"/>
+          </a:xfrm>
+          <a:prstGeom prst="rect">
+            <a:avLst/>
+          </a:prstGeom>
+        </p:spPr>
+        <p:txBody>
+          <a:bodyPr wrap="none">
             <a:spAutoFit/>
           </a:bodyPr>
           <a:lstStyle/>
@@ -6175,7 +6036,7 @@
                   <a:schemeClr val="bg1"/>
                 </a:solidFill>
               </a:rPr>
-              <a:t>International_Safe_Harbor_Privacy_Principles</a:t>
+              <a:t>Data_Protection_Directive</a:t>
             </a:r>
             <a:endParaRPr lang="en-US" dirty="0">
               <a:solidFill>
@@ -6188,13 +6049,20 @@
     </p:spTree>
     <p:extLst>
       <p:ext uri="{BB962C8B-B14F-4D97-AF65-F5344CB8AC3E}">
-        <p14:creationId xmlns:p14="http://schemas.microsoft.com/office/powerpoint/2010/main" val="602086475"/>
+        <p14:creationId xmlns:p14="http://schemas.microsoft.com/office/powerpoint/2010/main" val="89792983"/>
       </p:ext>
     </p:extLst>
   </p:cSld>
   <p:clrMapOvr>
     <a:masterClrMapping/>
   </p:clrMapOvr>
+  <p:timing>
+    <p:tnLst>
+      <p:par>
+        <p:cTn id="1" dur="indefinite" restart="never" nodeType="tmRoot"/>
+      </p:par>
+    </p:tnLst>
+  </p:timing>
 </p:sld>
 </file>
 
@@ -6231,9 +6099,10 @@
           <a:lstStyle/>
           <a:p>
             <a:r>
-              <a:rPr lang="en-US" dirty="0"/>
-              <a:t>EU–US Privacy Shield</a:t>
-            </a:r>
+              <a:rPr lang="en-US" dirty="0" smtClean="0"/>
+              <a:t>International Safe Harbor Privacy Principles</a:t>
+            </a:r>
+            <a:endParaRPr lang="en-US" dirty="0"/>
           </a:p>
         </p:txBody>
       </p:sp>
@@ -6254,7 +6123,11 @@
           <a:p>
             <a:r>
               <a:rPr lang="en-US" dirty="0" smtClean="0"/>
-              <a:t>EU and US State Department negotiated </a:t>
+              <a:t>Around </a:t>
+            </a:r>
+            <a:r>
+              <a:rPr lang="en-US" dirty="0" smtClean="0"/>
+              <a:t>2000 </a:t>
             </a:r>
             <a:r>
               <a:rPr lang="mr-IN" dirty="0" smtClean="0"/>
@@ -6262,25 +6135,28 @@
             </a:r>
             <a:r>
               <a:rPr lang="en-US" dirty="0" smtClean="0"/>
-              <a:t> 2016</a:t>
-            </a:r>
-          </a:p>
-          <a:p>
-            <a:r>
-              <a:rPr lang="en-US" dirty="0" smtClean="0"/>
-              <a:t>The European Commission "blessed" the agreement by publishing a document they ironically call the "adequacy decision"</a:t>
-            </a:r>
-          </a:p>
-          <a:p>
-            <a:r>
-              <a:rPr lang="en-US" dirty="0" smtClean="0"/>
-              <a:t>What it really meant was that Privacy Shield was the governing law, not any EU laws</a:t>
-            </a:r>
-          </a:p>
-          <a:p>
-            <a:r>
-              <a:rPr lang="en-US" dirty="0" smtClean="0"/>
-              <a:t>If you look at the "privacy shield documents" </a:t>
+              <a:t> The Reacting to the rise of the Internet</a:t>
+            </a:r>
+            <a:endParaRPr lang="en-US" dirty="0" smtClean="0"/>
+          </a:p>
+          <a:p>
+            <a:r>
+              <a:rPr lang="en-US" dirty="0" smtClean="0"/>
+              <a:t>Addressed issues surrounding US companies holding private data of EU citizens</a:t>
+            </a:r>
+          </a:p>
+          <a:p>
+            <a:r>
+              <a:rPr lang="en-US" dirty="0" smtClean="0"/>
+              <a:t>Not </a:t>
+            </a:r>
+            <a:r>
+              <a:rPr lang="en-US" dirty="0" smtClean="0"/>
+              <a:t>about learning </a:t>
+            </a:r>
+            <a:r>
+              <a:rPr lang="en-US" dirty="0" smtClean="0"/>
+              <a:t>data </a:t>
             </a:r>
             <a:r>
               <a:rPr lang="mr-IN" dirty="0" smtClean="0"/>
@@ -6288,7 +6164,21 @@
             </a:r>
             <a:r>
               <a:rPr lang="en-US" dirty="0" smtClean="0"/>
-              <a:t> they were just web pages </a:t>
+              <a:t> </a:t>
+            </a:r>
+            <a:r>
+              <a:rPr lang="en-US" dirty="0" err="1" smtClean="0"/>
+              <a:t>gmail</a:t>
+            </a:r>
+            <a:r>
+              <a:rPr lang="en-US" dirty="0" smtClean="0"/>
+              <a:t> did not exist until 2004</a:t>
+            </a:r>
+          </a:p>
+          <a:p>
+            <a:r>
+              <a:rPr lang="en-US" dirty="0" smtClean="0"/>
+              <a:t>Increasingly applied to world-scale vendors = Google, Twitter, Facebook </a:t>
             </a:r>
             <a:r>
               <a:rPr lang="mr-IN" dirty="0" smtClean="0"/>
@@ -6296,9 +6186,20 @@
             </a:r>
             <a:r>
               <a:rPr lang="en-US" dirty="0" smtClean="0"/>
-              <a:t> and they kept being edited</a:t>
-            </a:r>
-            <a:endParaRPr lang="en-US" dirty="0"/>
+              <a:t> who felt it was an annoyance</a:t>
+            </a:r>
+            <a:endParaRPr lang="en-US" dirty="0" smtClean="0"/>
+          </a:p>
+          <a:p>
+            <a:r>
+              <a:rPr lang="en-US" dirty="0" smtClean="0"/>
+              <a:t>They twisted the EU into legal knots and it was overturned in </a:t>
+            </a:r>
+            <a:r>
+              <a:rPr lang="en-US" dirty="0" smtClean="0"/>
+              <a:t>2015</a:t>
+            </a:r>
+            <a:endParaRPr lang="en-US" dirty="0" smtClean="0"/>
           </a:p>
         </p:txBody>
       </p:sp>
@@ -6310,8 +6211,8 @@
         </p:nvSpPr>
         <p:spPr>
           <a:xfrm>
-            <a:off x="4234249" y="5836678"/>
-            <a:ext cx="7368746" cy="369332"/>
+            <a:off x="3663778" y="5873749"/>
+            <a:ext cx="7690022" cy="369332"/>
           </a:xfrm>
           <a:prstGeom prst="rect">
             <a:avLst/>
@@ -6332,7 +6233,7 @@
               <a:t>https://</a:t>
             </a:r>
             <a:r>
-              <a:rPr lang="en-US" dirty="0" err="1" smtClean="0">
+              <a:rPr lang="en-US" dirty="0" err="1">
                 <a:solidFill>
                   <a:schemeClr val="bg1"/>
                 </a:solidFill>
@@ -6340,20 +6241,20 @@
               <a:t>en.wikipedia.org</a:t>
             </a:r>
             <a:r>
-              <a:rPr lang="en-US" dirty="0" smtClean="0">
+              <a:rPr lang="en-US" dirty="0">
                 <a:solidFill>
                   <a:schemeClr val="bg1"/>
                 </a:solidFill>
               </a:rPr>
-              <a:t>/wiki/EU-</a:t>
-            </a:r>
-            <a:r>
-              <a:rPr lang="en-US" dirty="0" err="1" smtClean="0">
+              <a:t>/wiki/</a:t>
+            </a:r>
+            <a:r>
+              <a:rPr lang="en-US" dirty="0" err="1">
                 <a:solidFill>
                   <a:schemeClr val="bg1"/>
                 </a:solidFill>
               </a:rPr>
-              <a:t>US_Privacy_Shield</a:t>
+              <a:t>International_Safe_Harbor_Privacy_Principles</a:t>
             </a:r>
             <a:endParaRPr lang="en-US" dirty="0">
               <a:solidFill>
@@ -6366,13 +6267,20 @@
     </p:spTree>
     <p:extLst>
       <p:ext uri="{BB962C8B-B14F-4D97-AF65-F5344CB8AC3E}">
-        <p14:creationId xmlns:p14="http://schemas.microsoft.com/office/powerpoint/2010/main" val="1009162025"/>
+        <p14:creationId xmlns:p14="http://schemas.microsoft.com/office/powerpoint/2010/main" val="602086475"/>
       </p:ext>
     </p:extLst>
   </p:cSld>
   <p:clrMapOvr>
     <a:masterClrMapping/>
   </p:clrMapOvr>
+  <p:timing>
+    <p:tnLst>
+      <p:par>
+        <p:cTn id="1" dur="indefinite" restart="never" nodeType="tmRoot"/>
+      </p:par>
+    </p:tnLst>
+  </p:timing>
 </p:sld>
 </file>
 
@@ -6409,8 +6317,89 @@
           <a:lstStyle/>
           <a:p>
             <a:r>
-              <a:rPr lang="en-US" dirty="0" smtClean="0"/>
-              <a:t>20 Years of Privacy Efforts in the EU</a:t>
+              <a:rPr lang="en-US" dirty="0"/>
+              <a:t>EU–US Privacy Shield</a:t>
+            </a:r>
+          </a:p>
+        </p:txBody>
+      </p:sp>
+      <p:sp>
+        <p:nvSpPr>
+          <p:cNvPr id="3" name="Content Placeholder 2"/>
+          <p:cNvSpPr>
+            <a:spLocks noGrp="1"/>
+          </p:cNvSpPr>
+          <p:nvPr>
+            <p:ph idx="1"/>
+          </p:nvPr>
+        </p:nvSpPr>
+        <p:spPr/>
+        <p:txBody>
+          <a:bodyPr/>
+          <a:lstStyle/>
+          <a:p>
+            <a:r>
+              <a:rPr lang="en-US" dirty="0" smtClean="0"/>
+              <a:t>EU and US State Department negotiated </a:t>
+            </a:r>
+            <a:r>
+              <a:rPr lang="mr-IN" dirty="0" smtClean="0"/>
+              <a:t>–</a:t>
+            </a:r>
+            <a:r>
+              <a:rPr lang="en-US" dirty="0" smtClean="0"/>
+              <a:t> 2016</a:t>
+            </a:r>
+          </a:p>
+          <a:p>
+            <a:r>
+              <a:rPr lang="en-US" dirty="0" smtClean="0"/>
+              <a:t>I am guessing the idea was that working through the US State Department might make world-scale vendors "toe the line" </a:t>
+            </a:r>
+            <a:endParaRPr lang="en-US" dirty="0" smtClean="0"/>
+          </a:p>
+          <a:p>
+            <a:r>
+              <a:rPr lang="en-US" dirty="0" smtClean="0"/>
+              <a:t>I researched this during that time period </a:t>
+            </a:r>
+            <a:r>
+              <a:rPr lang="mr-IN" dirty="0" smtClean="0"/>
+              <a:t>–</a:t>
+            </a:r>
+            <a:r>
+              <a:rPr lang="en-US" dirty="0" smtClean="0"/>
+              <a:t> I found web </a:t>
+            </a:r>
+            <a:r>
+              <a:rPr lang="en-US" dirty="0" smtClean="0"/>
+              <a:t>pages </a:t>
+            </a:r>
+            <a:r>
+              <a:rPr lang="mr-IN" dirty="0" smtClean="0"/>
+              <a:t>–</a:t>
+            </a:r>
+            <a:r>
+              <a:rPr lang="en-US" dirty="0" smtClean="0"/>
+              <a:t> and they kept being </a:t>
+            </a:r>
+            <a:r>
+              <a:rPr lang="en-US" dirty="0" smtClean="0"/>
+              <a:t>edited</a:t>
+            </a:r>
+          </a:p>
+          <a:p>
+            <a:r>
+              <a:rPr lang="en-US" dirty="0" smtClean="0"/>
+              <a:t>Kind of a stop gap until GDPR </a:t>
+            </a:r>
+            <a:r>
+              <a:rPr lang="mr-IN" dirty="0" smtClean="0"/>
+              <a:t>–</a:t>
+            </a:r>
+            <a:r>
+              <a:rPr lang="en-US" dirty="0" smtClean="0"/>
+              <a:t> but pretty leaky</a:t>
             </a:r>
             <a:endParaRPr lang="en-US" dirty="0"/>
           </a:p>
@@ -6418,102 +6407,18 @@
       </p:sp>
       <p:sp>
         <p:nvSpPr>
-          <p:cNvPr id="3" name="Content Placeholder 2"/>
-          <p:cNvSpPr>
-            <a:spLocks noGrp="1"/>
-          </p:cNvSpPr>
-          <p:nvPr>
-            <p:ph idx="1"/>
-          </p:nvPr>
-        </p:nvSpPr>
-        <p:spPr>
-          <a:xfrm>
-            <a:off x="838200" y="1825626"/>
-            <a:ext cx="10515600" cy="1646624"/>
-          </a:xfrm>
-        </p:spPr>
-        <p:txBody>
-          <a:bodyPr>
-            <a:normAutofit/>
-          </a:bodyPr>
-          <a:lstStyle/>
-          <a:p>
-            <a:r>
-              <a:rPr lang="en-US" dirty="0" smtClean="0"/>
-              <a:t>I went to a Spanish University about 3 years ago (pre-GDPR) to talk about Sakai and they showed me how they solved privacy issues with their business school using a US-based LMS</a:t>
-            </a:r>
-            <a:endParaRPr lang="en-US" dirty="0"/>
-          </a:p>
-        </p:txBody>
-      </p:sp>
-      <p:sp>
-        <p:nvSpPr>
-          <p:cNvPr id="4" name="TextBox 3"/>
-          <p:cNvSpPr txBox="1"/>
+          <p:cNvPr id="4" name="Rectangle 3"/>
+          <p:cNvSpPr/>
           <p:nvPr/>
         </p:nvSpPr>
         <p:spPr>
           <a:xfrm>
-            <a:off x="1396314" y="3187060"/>
-            <a:ext cx="9759777" cy="1384995"/>
+            <a:off x="4234249" y="5836678"/>
+            <a:ext cx="7368746" cy="369332"/>
           </a:xfrm>
           <a:prstGeom prst="rect">
             <a:avLst/>
           </a:prstGeom>
-          <a:noFill/>
-        </p:spPr>
-        <p:txBody>
-          <a:bodyPr wrap="square" rtlCol="0">
-            <a:spAutoFit/>
-          </a:bodyPr>
-          <a:lstStyle/>
-          <a:p>
-            <a:r>
-              <a:rPr lang="en-US" sz="2800" dirty="0" smtClean="0">
-                <a:solidFill>
-                  <a:srgbClr val="FFFF00"/>
-                </a:solidFill>
-              </a:rPr>
-              <a:t>The </a:t>
-            </a:r>
-            <a:r>
-              <a:rPr lang="en-US" sz="2800" i="1" u="sng" dirty="0" smtClean="0">
-                <a:solidFill>
-                  <a:srgbClr val="FFFF00"/>
-                </a:solidFill>
-              </a:rPr>
-              <a:t>first time</a:t>
-            </a:r>
-            <a:r>
-              <a:rPr lang="en-US" sz="2800" dirty="0" smtClean="0">
-                <a:solidFill>
-                  <a:srgbClr val="FFFF00"/>
-                </a:solidFill>
-              </a:rPr>
-              <a:t> you log into their LMS there is a popup that says in effect, we use a US-Based LMS, by checking below, you are OK with this. </a:t>
-            </a:r>
-            <a:endParaRPr lang="en-US" sz="2800" dirty="0">
-              <a:solidFill>
-                <a:srgbClr val="FFFF00"/>
-              </a:solidFill>
-            </a:endParaRPr>
-          </a:p>
-        </p:txBody>
-      </p:sp>
-      <p:sp>
-        <p:nvSpPr>
-          <p:cNvPr id="5" name="Rectangle 4"/>
-          <p:cNvSpPr/>
-          <p:nvPr/>
-        </p:nvSpPr>
-        <p:spPr>
-          <a:xfrm>
-            <a:off x="630195" y="4759543"/>
-            <a:ext cx="10972800" cy="954107"/>
-          </a:xfrm>
-          <a:prstGeom prst="rect">
-            <a:avLst/>
-          </a:prstGeom>
         </p:spPr>
         <p:txBody>
           <a:bodyPr wrap="square">
@@ -6522,14 +6427,38 @@
           <a:lstStyle/>
           <a:p>
             <a:r>
-              <a:rPr lang="en-US" sz="2800" dirty="0" smtClean="0">
+              <a:rPr lang="en-US" dirty="0">
                 <a:solidFill>
                   <a:schemeClr val="bg1"/>
                 </a:solidFill>
               </a:rPr>
-              <a:t>For two decades, Google and Facebook  pummel the EU and once the EU is lying on the ground bleeding, the US LMS companies put up a popup.</a:t>
-            </a:r>
-            <a:endParaRPr lang="en-US" sz="2800" dirty="0">
+              <a:t>https://</a:t>
+            </a:r>
+            <a:r>
+              <a:rPr lang="en-US" dirty="0" err="1" smtClean="0">
+                <a:solidFill>
+                  <a:schemeClr val="bg1"/>
+                </a:solidFill>
+              </a:rPr>
+              <a:t>en.wikipedia.org</a:t>
+            </a:r>
+            <a:r>
+              <a:rPr lang="en-US" dirty="0" smtClean="0">
+                <a:solidFill>
+                  <a:schemeClr val="bg1"/>
+                </a:solidFill>
+              </a:rPr>
+              <a:t>/wiki/EU-</a:t>
+            </a:r>
+            <a:r>
+              <a:rPr lang="en-US" dirty="0" err="1" smtClean="0">
+                <a:solidFill>
+                  <a:schemeClr val="bg1"/>
+                </a:solidFill>
+              </a:rPr>
+              <a:t>US_Privacy_Shield</a:t>
+            </a:r>
+            <a:endParaRPr lang="en-US" dirty="0">
               <a:solidFill>
                 <a:schemeClr val="bg1"/>
               </a:solidFill>
@@ -6540,7 +6469,7 @@
     </p:spTree>
     <p:extLst>
       <p:ext uri="{BB962C8B-B14F-4D97-AF65-F5344CB8AC3E}">
-        <p14:creationId xmlns:p14="http://schemas.microsoft.com/office/powerpoint/2010/main" val="1459799377"/>
+        <p14:creationId xmlns:p14="http://schemas.microsoft.com/office/powerpoint/2010/main" val="1009162025"/>
       </p:ext>
     </p:extLst>
   </p:cSld>
@@ -6584,15 +6513,7 @@
           <a:p>
             <a:r>
               <a:rPr lang="en-US" dirty="0" smtClean="0"/>
-              <a:t>GDPR Principles </a:t>
-            </a:r>
-            <a:r>
-              <a:rPr lang="mr-IN" dirty="0" smtClean="0"/>
-              <a:t>–</a:t>
-            </a:r>
-            <a:r>
-              <a:rPr lang="en-US" dirty="0" smtClean="0"/>
-              <a:t> 2016 / 2018</a:t>
+              <a:t>20 Years of Privacy Efforts in the EU</a:t>
             </a:r>
             <a:endParaRPr lang="en-US" dirty="0"/>
           </a:p>
@@ -6608,7 +6529,12 @@
             <p:ph idx="1"/>
           </p:nvPr>
         </p:nvSpPr>
-        <p:spPr/>
+        <p:spPr>
+          <a:xfrm>
+            <a:off x="838200" y="1825626"/>
+            <a:ext cx="10515600" cy="1646624"/>
+          </a:xfrm>
+        </p:spPr>
         <p:txBody>
           <a:bodyPr>
             <a:normAutofit/>
@@ -6617,73 +6543,139 @@
           <a:p>
             <a:r>
               <a:rPr lang="en-US" dirty="0" smtClean="0"/>
-              <a:t>Lawfulness</a:t>
-            </a:r>
-            <a:r>
-              <a:rPr lang="en-US" dirty="0"/>
-              <a:t>, fairness and </a:t>
-            </a:r>
-            <a:r>
-              <a:rPr lang="en-US" dirty="0" smtClean="0"/>
-              <a:t>transparency</a:t>
-            </a:r>
-          </a:p>
-          <a:p>
-            <a:r>
-              <a:rPr lang="en-US" dirty="0" smtClean="0"/>
-              <a:t>Purpose limitation</a:t>
-            </a:r>
-          </a:p>
-          <a:p>
-            <a:r>
-              <a:rPr lang="en-US" dirty="0" smtClean="0"/>
-              <a:t>Data </a:t>
-            </a:r>
-            <a:r>
-              <a:rPr lang="en-US" dirty="0" err="1" smtClean="0"/>
-              <a:t>minimisation</a:t>
-            </a:r>
-            <a:endParaRPr lang="en-US" dirty="0" smtClean="0"/>
-          </a:p>
-          <a:p>
-            <a:r>
-              <a:rPr lang="en-US" dirty="0" smtClean="0"/>
-              <a:t>Accuracy</a:t>
-            </a:r>
-          </a:p>
-          <a:p>
-            <a:r>
-              <a:rPr lang="en-US" dirty="0" smtClean="0"/>
-              <a:t>Storage limitation</a:t>
-            </a:r>
-          </a:p>
-          <a:p>
-            <a:r>
-              <a:rPr lang="en-US" dirty="0" smtClean="0"/>
-              <a:t>Integrity </a:t>
-            </a:r>
-            <a:r>
-              <a:rPr lang="en-US" dirty="0"/>
-              <a:t>and confidentiality (</a:t>
-            </a:r>
-            <a:r>
-              <a:rPr lang="en-US" dirty="0" smtClean="0"/>
-              <a:t>security)</a:t>
-            </a:r>
-          </a:p>
-          <a:p>
-            <a:r>
-              <a:rPr lang="en-US" dirty="0" smtClean="0"/>
-              <a:t>Accountability</a:t>
+              <a:t>I went to a Spanish University about </a:t>
+            </a:r>
+            <a:r>
+              <a:rPr lang="en-US" dirty="0" smtClean="0"/>
+              <a:t>2016 (</a:t>
+            </a:r>
+            <a:r>
+              <a:rPr lang="en-US" dirty="0" smtClean="0"/>
+              <a:t>pre-GDPR) to talk about my LMS and they showed me how they solved privacy issues with their business school using a US-based LMS</a:t>
             </a:r>
             <a:endParaRPr lang="en-US" dirty="0"/>
+          </a:p>
+        </p:txBody>
+      </p:sp>
+      <p:sp>
+        <p:nvSpPr>
+          <p:cNvPr id="4" name="TextBox 3"/>
+          <p:cNvSpPr txBox="1"/>
+          <p:nvPr/>
+        </p:nvSpPr>
+        <p:spPr>
+          <a:xfrm>
+            <a:off x="1396314" y="3187060"/>
+            <a:ext cx="9759777" cy="1384995"/>
+          </a:xfrm>
+          <a:prstGeom prst="rect">
+            <a:avLst/>
+          </a:prstGeom>
+          <a:noFill/>
+        </p:spPr>
+        <p:txBody>
+          <a:bodyPr wrap="square" rtlCol="0">
+            <a:spAutoFit/>
+          </a:bodyPr>
+          <a:lstStyle/>
+          <a:p>
+            <a:r>
+              <a:rPr lang="en-US" sz="2800" dirty="0" smtClean="0">
+                <a:solidFill>
+                  <a:srgbClr val="FFFF00"/>
+                </a:solidFill>
+              </a:rPr>
+              <a:t>The </a:t>
+            </a:r>
+            <a:r>
+              <a:rPr lang="en-US" sz="2800" i="1" u="sng" dirty="0" smtClean="0">
+                <a:solidFill>
+                  <a:srgbClr val="FFFF00"/>
+                </a:solidFill>
+              </a:rPr>
+              <a:t>first time</a:t>
+            </a:r>
+            <a:r>
+              <a:rPr lang="en-US" sz="2800" dirty="0" smtClean="0">
+                <a:solidFill>
+                  <a:srgbClr val="FFFF00"/>
+                </a:solidFill>
+              </a:rPr>
+              <a:t> you log into their LMS there is a popup that says in effect, we use a US-Based LMS, by checking below, you are OK with this. </a:t>
+            </a:r>
+            <a:endParaRPr lang="en-US" sz="2800" dirty="0">
+              <a:solidFill>
+                <a:srgbClr val="FFFF00"/>
+              </a:solidFill>
+            </a:endParaRPr>
+          </a:p>
+        </p:txBody>
+      </p:sp>
+      <p:sp>
+        <p:nvSpPr>
+          <p:cNvPr id="5" name="Rectangle 4"/>
+          <p:cNvSpPr/>
+          <p:nvPr/>
+        </p:nvSpPr>
+        <p:spPr>
+          <a:xfrm>
+            <a:off x="630195" y="4759543"/>
+            <a:ext cx="10972800" cy="954107"/>
+          </a:xfrm>
+          <a:prstGeom prst="rect">
+            <a:avLst/>
+          </a:prstGeom>
+        </p:spPr>
+        <p:txBody>
+          <a:bodyPr wrap="square">
+            <a:spAutoFit/>
+          </a:bodyPr>
+          <a:lstStyle/>
+          <a:p>
+            <a:r>
+              <a:rPr lang="en-US" sz="2800" dirty="0" smtClean="0">
+                <a:solidFill>
+                  <a:schemeClr val="bg1"/>
+                </a:solidFill>
+              </a:rPr>
+              <a:t>US-based world-scale companies were undefeated.  With EU on defense all the time, the </a:t>
+            </a:r>
+            <a:r>
+              <a:rPr lang="en-US" sz="2800" dirty="0" smtClean="0">
+                <a:solidFill>
+                  <a:schemeClr val="bg1"/>
+                </a:solidFill>
+              </a:rPr>
+              <a:t>US LMS companies </a:t>
+            </a:r>
+            <a:r>
+              <a:rPr lang="en-US" sz="2800" dirty="0" smtClean="0">
+                <a:solidFill>
+                  <a:schemeClr val="bg1"/>
+                </a:solidFill>
+              </a:rPr>
+              <a:t>just put up </a:t>
+            </a:r>
+            <a:r>
+              <a:rPr lang="en-US" sz="2800" dirty="0" smtClean="0">
+                <a:solidFill>
+                  <a:schemeClr val="bg1"/>
+                </a:solidFill>
+              </a:rPr>
+              <a:t>a popup.</a:t>
+            </a:r>
+            <a:endParaRPr lang="en-US" sz="2800" dirty="0">
+              <a:solidFill>
+                <a:schemeClr val="bg1"/>
+              </a:solidFill>
+            </a:endParaRPr>
           </a:p>
         </p:txBody>
       </p:sp>
     </p:spTree>
     <p:extLst>
       <p:ext uri="{BB962C8B-B14F-4D97-AF65-F5344CB8AC3E}">
-        <p14:creationId xmlns:p14="http://schemas.microsoft.com/office/powerpoint/2010/main" val="882650686"/>
+        <p14:creationId xmlns:p14="http://schemas.microsoft.com/office/powerpoint/2010/main" val="1459799377"/>
       </p:ext>
     </p:extLst>
   </p:cSld>

</xml_diff>